<commit_message>
Updated object-oriented design slides.
</commit_message>
<xml_diff>
--- a/slides/Object-oriented Design.pptx
+++ b/slides/Object-oriented Design.pptx
@@ -64,6 +64,23 @@
     <p:sldId id="403" r:id="rId58"/>
     <p:sldId id="404" r:id="rId59"/>
     <p:sldId id="405" r:id="rId60"/>
+    <p:sldId id="406" r:id="rId61"/>
+    <p:sldId id="407" r:id="rId62"/>
+    <p:sldId id="408" r:id="rId63"/>
+    <p:sldId id="409" r:id="rId64"/>
+    <p:sldId id="410" r:id="rId65"/>
+    <p:sldId id="411" r:id="rId66"/>
+    <p:sldId id="412" r:id="rId67"/>
+    <p:sldId id="413" r:id="rId68"/>
+    <p:sldId id="414" r:id="rId69"/>
+    <p:sldId id="415" r:id="rId70"/>
+    <p:sldId id="416" r:id="rId71"/>
+    <p:sldId id="417" r:id="rId72"/>
+    <p:sldId id="418" r:id="rId73"/>
+    <p:sldId id="419" r:id="rId74"/>
+    <p:sldId id="420" r:id="rId75"/>
+    <p:sldId id="421" r:id="rId76"/>
+    <p:sldId id="422" r:id="rId77"/>
   </p:sldIdLst>
   <p:sldSz cx="12192000" cy="6858000"/>
   <p:notesSz cx="6858000" cy="9144000"/>
@@ -238,7 +255,7 @@
           <a:noFill/>
           <a:extLst>
             <a:ext uri="{909E8E84-426E-40dd-AFC4-6F175D3DCCD1}">
-              <a14:hiddenFill xmlns="" xmlns:a14="http://schemas.microsoft.com/office/drawing/2010/main">
+              <a14:hiddenFill xmlns:a14="http://schemas.microsoft.com/office/drawing/2010/main" xmlns="">
                 <a:solidFill>
                   <a:srgbClr val="FFFFFF"/>
                 </a:solidFill>
@@ -297,7 +314,7 @@
             </a:ln>
             <a:extLst>
               <a:ext uri="{91240B29-F687-4f45-9708-019B960494DF}">
-                <a14:hiddenLine xmlns="" xmlns:a14="http://schemas.microsoft.com/office/drawing/2010/main" w="9525">
+                <a14:hiddenLine xmlns:a14="http://schemas.microsoft.com/office/drawing/2010/main" xmlns="" w="9525">
                   <a:solidFill>
                     <a:srgbClr val="000000"/>
                   </a:solidFill>
@@ -387,7 +404,7 @@
             </a:ln>
             <a:extLst>
               <a:ext uri="{91240B29-F687-4f45-9708-019B960494DF}">
-                <a14:hiddenLine xmlns="" xmlns:a14="http://schemas.microsoft.com/office/drawing/2010/main" w="9525">
+                <a14:hiddenLine xmlns:a14="http://schemas.microsoft.com/office/drawing/2010/main" xmlns="" w="9525">
                   <a:solidFill>
                     <a:srgbClr val="000000"/>
                   </a:solidFill>
@@ -477,7 +494,7 @@
             </a:ln>
             <a:extLst>
               <a:ext uri="{91240B29-F687-4f45-9708-019B960494DF}">
-                <a14:hiddenLine xmlns="" xmlns:a14="http://schemas.microsoft.com/office/drawing/2010/main" w="9525">
+                <a14:hiddenLine xmlns:a14="http://schemas.microsoft.com/office/drawing/2010/main" xmlns="" w="9525">
                   <a:solidFill>
                     <a:srgbClr val="000000"/>
                   </a:solidFill>
@@ -511,7 +528,7 @@
             </a:ln>
             <a:extLst>
               <a:ext uri="{91240B29-F687-4f45-9708-019B960494DF}">
-                <a14:hiddenLine xmlns="" xmlns:a14="http://schemas.microsoft.com/office/drawing/2010/main" w="9525">
+                <a14:hiddenLine xmlns:a14="http://schemas.microsoft.com/office/drawing/2010/main" xmlns="" w="9525">
                   <a:solidFill>
                     <a:srgbClr val="000000"/>
                   </a:solidFill>
@@ -601,7 +618,7 @@
             </a:ln>
             <a:extLst>
               <a:ext uri="{91240B29-F687-4f45-9708-019B960494DF}">
-                <a14:hiddenLine xmlns="" xmlns:a14="http://schemas.microsoft.com/office/drawing/2010/main" w="9525">
+                <a14:hiddenLine xmlns:a14="http://schemas.microsoft.com/office/drawing/2010/main" xmlns="" w="9525">
                   <a:solidFill>
                     <a:srgbClr val="000000"/>
                   </a:solidFill>
@@ -663,7 +680,7 @@
             </a:ln>
             <a:extLst>
               <a:ext uri="{91240B29-F687-4f45-9708-019B960494DF}">
-                <a14:hiddenLine xmlns="" xmlns:a14="http://schemas.microsoft.com/office/drawing/2010/main" w="9525">
+                <a14:hiddenLine xmlns:a14="http://schemas.microsoft.com/office/drawing/2010/main" xmlns="" w="9525">
                   <a:solidFill>
                     <a:srgbClr val="000000"/>
                   </a:solidFill>
@@ -725,7 +742,7 @@
             </a:ln>
             <a:extLst>
               <a:ext uri="{91240B29-F687-4f45-9708-019B960494DF}">
-                <a14:hiddenLine xmlns="" xmlns:a14="http://schemas.microsoft.com/office/drawing/2010/main" w="9525">
+                <a14:hiddenLine xmlns:a14="http://schemas.microsoft.com/office/drawing/2010/main" xmlns="" w="9525">
                   <a:solidFill>
                     <a:srgbClr val="000000"/>
                   </a:solidFill>
@@ -815,7 +832,7 @@
             </a:ln>
             <a:extLst>
               <a:ext uri="{91240B29-F687-4f45-9708-019B960494DF}">
-                <a14:hiddenLine xmlns="" xmlns:a14="http://schemas.microsoft.com/office/drawing/2010/main" w="9525">
+                <a14:hiddenLine xmlns:a14="http://schemas.microsoft.com/office/drawing/2010/main" xmlns="" w="9525">
                   <a:solidFill>
                     <a:srgbClr val="000000"/>
                   </a:solidFill>
@@ -877,7 +894,7 @@
             </a:ln>
             <a:extLst>
               <a:ext uri="{91240B29-F687-4f45-9708-019B960494DF}">
-                <a14:hiddenLine xmlns="" xmlns:a14="http://schemas.microsoft.com/office/drawing/2010/main" w="9525">
+                <a14:hiddenLine xmlns:a14="http://schemas.microsoft.com/office/drawing/2010/main" xmlns="" w="9525">
                   <a:solidFill>
                     <a:srgbClr val="000000"/>
                   </a:solidFill>
@@ -939,7 +956,7 @@
             </a:ln>
             <a:extLst>
               <a:ext uri="{91240B29-F687-4f45-9708-019B960494DF}">
-                <a14:hiddenLine xmlns="" xmlns:a14="http://schemas.microsoft.com/office/drawing/2010/main" w="9525">
+                <a14:hiddenLine xmlns:a14="http://schemas.microsoft.com/office/drawing/2010/main" xmlns="" w="9525">
                   <a:solidFill>
                     <a:srgbClr val="000000"/>
                   </a:solidFill>
@@ -1029,7 +1046,7 @@
             </a:ln>
             <a:extLst>
               <a:ext uri="{91240B29-F687-4f45-9708-019B960494DF}">
-                <a14:hiddenLine xmlns="" xmlns:a14="http://schemas.microsoft.com/office/drawing/2010/main" w="9525">
+                <a14:hiddenLine xmlns:a14="http://schemas.microsoft.com/office/drawing/2010/main" xmlns="" w="9525">
                   <a:solidFill>
                     <a:srgbClr val="000000"/>
                   </a:solidFill>
@@ -1119,7 +1136,7 @@
             </a:ln>
             <a:extLst>
               <a:ext uri="{91240B29-F687-4f45-9708-019B960494DF}">
-                <a14:hiddenLine xmlns="" xmlns:a14="http://schemas.microsoft.com/office/drawing/2010/main" w="9525">
+                <a14:hiddenLine xmlns:a14="http://schemas.microsoft.com/office/drawing/2010/main" xmlns="" w="9525">
                   <a:solidFill>
                     <a:srgbClr val="000000"/>
                   </a:solidFill>
@@ -1181,7 +1198,7 @@
             </a:ln>
             <a:extLst>
               <a:ext uri="{91240B29-F687-4f45-9708-019B960494DF}">
-                <a14:hiddenLine xmlns="" xmlns:a14="http://schemas.microsoft.com/office/drawing/2010/main" w="9525">
+                <a14:hiddenLine xmlns:a14="http://schemas.microsoft.com/office/drawing/2010/main" xmlns="" w="9525">
                   <a:solidFill>
                     <a:srgbClr val="000000"/>
                   </a:solidFill>
@@ -1291,7 +1308,7 @@
             </a:ln>
             <a:extLst>
               <a:ext uri="{91240B29-F687-4f45-9708-019B960494DF}">
-                <a14:hiddenLine xmlns="" xmlns:a14="http://schemas.microsoft.com/office/drawing/2010/main" w="9525">
+                <a14:hiddenLine xmlns:a14="http://schemas.microsoft.com/office/drawing/2010/main" xmlns="" w="9525">
                   <a:solidFill>
                     <a:srgbClr val="000000"/>
                   </a:solidFill>
@@ -1353,7 +1370,7 @@
             </a:ln>
             <a:extLst>
               <a:ext uri="{91240B29-F687-4f45-9708-019B960494DF}">
-                <a14:hiddenLine xmlns="" xmlns:a14="http://schemas.microsoft.com/office/drawing/2010/main" w="9525">
+                <a14:hiddenLine xmlns:a14="http://schemas.microsoft.com/office/drawing/2010/main" xmlns="" w="9525">
                   <a:solidFill>
                     <a:srgbClr val="000000"/>
                   </a:solidFill>
@@ -1443,7 +1460,7 @@
             </a:ln>
             <a:extLst>
               <a:ext uri="{91240B29-F687-4f45-9708-019B960494DF}">
-                <a14:hiddenLine xmlns="" xmlns:a14="http://schemas.microsoft.com/office/drawing/2010/main" w="9525">
+                <a14:hiddenLine xmlns:a14="http://schemas.microsoft.com/office/drawing/2010/main" xmlns="" w="9525">
                   <a:solidFill>
                     <a:srgbClr val="000000"/>
                   </a:solidFill>
@@ -1533,7 +1550,7 @@
             </a:ln>
             <a:extLst>
               <a:ext uri="{91240B29-F687-4f45-9708-019B960494DF}">
-                <a14:hiddenLine xmlns="" xmlns:a14="http://schemas.microsoft.com/office/drawing/2010/main" w="9525">
+                <a14:hiddenLine xmlns:a14="http://schemas.microsoft.com/office/drawing/2010/main" xmlns="" w="9525">
                   <a:solidFill>
                     <a:srgbClr val="000000"/>
                   </a:solidFill>
@@ -1595,7 +1612,7 @@
             </a:ln>
             <a:extLst>
               <a:ext uri="{91240B29-F687-4f45-9708-019B960494DF}">
-                <a14:hiddenLine xmlns="" xmlns:a14="http://schemas.microsoft.com/office/drawing/2010/main" w="9525">
+                <a14:hiddenLine xmlns:a14="http://schemas.microsoft.com/office/drawing/2010/main" xmlns="" w="9525">
                   <a:solidFill>
                     <a:srgbClr val="000000"/>
                   </a:solidFill>
@@ -1685,7 +1702,7 @@
             </a:ln>
             <a:extLst>
               <a:ext uri="{91240B29-F687-4f45-9708-019B960494DF}">
-                <a14:hiddenLine xmlns="" xmlns:a14="http://schemas.microsoft.com/office/drawing/2010/main" w="9525">
+                <a14:hiddenLine xmlns:a14="http://schemas.microsoft.com/office/drawing/2010/main" xmlns="" w="9525">
                   <a:solidFill>
                     <a:srgbClr val="000000"/>
                   </a:solidFill>
@@ -1775,7 +1792,7 @@
             </a:ln>
             <a:extLst>
               <a:ext uri="{91240B29-F687-4f45-9708-019B960494DF}">
-                <a14:hiddenLine xmlns="" xmlns:a14="http://schemas.microsoft.com/office/drawing/2010/main" w="9525">
+                <a14:hiddenLine xmlns:a14="http://schemas.microsoft.com/office/drawing/2010/main" xmlns="" w="9525">
                   <a:solidFill>
                     <a:srgbClr val="000000"/>
                   </a:solidFill>
@@ -1831,7 +1848,7 @@
             </a:ln>
             <a:extLst>
               <a:ext uri="{91240B29-F687-4f45-9708-019B960494DF}">
-                <a14:hiddenLine xmlns="" xmlns:a14="http://schemas.microsoft.com/office/drawing/2010/main" w="9525">
+                <a14:hiddenLine xmlns:a14="http://schemas.microsoft.com/office/drawing/2010/main" xmlns="" w="9525">
                   <a:solidFill>
                     <a:srgbClr val="000000"/>
                   </a:solidFill>
@@ -1921,7 +1938,7 @@
             </a:ln>
             <a:extLst>
               <a:ext uri="{91240B29-F687-4f45-9708-019B960494DF}">
-                <a14:hiddenLine xmlns="" xmlns:a14="http://schemas.microsoft.com/office/drawing/2010/main" w="9525">
+                <a14:hiddenLine xmlns:a14="http://schemas.microsoft.com/office/drawing/2010/main" xmlns="" w="9525">
                   <a:solidFill>
                     <a:srgbClr val="000000"/>
                   </a:solidFill>
@@ -1977,7 +1994,7 @@
             </a:ln>
             <a:extLst>
               <a:ext uri="{91240B29-F687-4f45-9708-019B960494DF}">
-                <a14:hiddenLine xmlns="" xmlns:a14="http://schemas.microsoft.com/office/drawing/2010/main" w="9525">
+                <a14:hiddenLine xmlns:a14="http://schemas.microsoft.com/office/drawing/2010/main" xmlns="" w="9525">
                   <a:solidFill>
                     <a:srgbClr val="000000"/>
                   </a:solidFill>
@@ -2067,7 +2084,7 @@
             </a:ln>
             <a:extLst>
               <a:ext uri="{91240B29-F687-4f45-9708-019B960494DF}">
-                <a14:hiddenLine xmlns="" xmlns:a14="http://schemas.microsoft.com/office/drawing/2010/main" w="9525">
+                <a14:hiddenLine xmlns:a14="http://schemas.microsoft.com/office/drawing/2010/main" xmlns="" w="9525">
                   <a:solidFill>
                     <a:srgbClr val="000000"/>
                   </a:solidFill>
@@ -2135,7 +2152,7 @@
             </a:ln>
             <a:extLst>
               <a:ext uri="{91240B29-F687-4f45-9708-019B960494DF}">
-                <a14:hiddenLine xmlns="" xmlns:a14="http://schemas.microsoft.com/office/drawing/2010/main" w="9525">
+                <a14:hiddenLine xmlns:a14="http://schemas.microsoft.com/office/drawing/2010/main" xmlns="" w="9525">
                   <a:solidFill>
                     <a:srgbClr val="000000"/>
                   </a:solidFill>
@@ -2225,7 +2242,7 @@
             </a:ln>
             <a:extLst>
               <a:ext uri="{91240B29-F687-4f45-9708-019B960494DF}">
-                <a14:hiddenLine xmlns="" xmlns:a14="http://schemas.microsoft.com/office/drawing/2010/main" w="9525">
+                <a14:hiddenLine xmlns:a14="http://schemas.microsoft.com/office/drawing/2010/main" xmlns="" w="9525">
                   <a:solidFill>
                     <a:srgbClr val="000000"/>
                   </a:solidFill>
@@ -2293,7 +2310,7 @@
             </a:ln>
             <a:extLst>
               <a:ext uri="{91240B29-F687-4f45-9708-019B960494DF}">
-                <a14:hiddenLine xmlns="" xmlns:a14="http://schemas.microsoft.com/office/drawing/2010/main" w="9525">
+                <a14:hiddenLine xmlns:a14="http://schemas.microsoft.com/office/drawing/2010/main" xmlns="" w="9525">
                   <a:solidFill>
                     <a:srgbClr val="000000"/>
                   </a:solidFill>
@@ -2383,7 +2400,7 @@
             </a:ln>
             <a:extLst>
               <a:ext uri="{91240B29-F687-4f45-9708-019B960494DF}">
-                <a14:hiddenLine xmlns="" xmlns:a14="http://schemas.microsoft.com/office/drawing/2010/main" w="9525">
+                <a14:hiddenLine xmlns:a14="http://schemas.microsoft.com/office/drawing/2010/main" xmlns="" w="9525">
                   <a:solidFill>
                     <a:srgbClr val="000000"/>
                   </a:solidFill>
@@ -2417,7 +2434,7 @@
             </a:ln>
             <a:extLst>
               <a:ext uri="{91240B29-F687-4f45-9708-019B960494DF}">
-                <a14:hiddenLine xmlns="" xmlns:a14="http://schemas.microsoft.com/office/drawing/2010/main" w="9525">
+                <a14:hiddenLine xmlns:a14="http://schemas.microsoft.com/office/drawing/2010/main" xmlns="" w="9525">
                   <a:solidFill>
                     <a:srgbClr val="000000"/>
                   </a:solidFill>
@@ -2507,7 +2524,7 @@
             </a:ln>
             <a:extLst>
               <a:ext uri="{91240B29-F687-4f45-9708-019B960494DF}">
-                <a14:hiddenLine xmlns="" xmlns:a14="http://schemas.microsoft.com/office/drawing/2010/main" w="9525">
+                <a14:hiddenLine xmlns:a14="http://schemas.microsoft.com/office/drawing/2010/main" xmlns="" w="9525">
                   <a:solidFill>
                     <a:srgbClr val="000000"/>
                   </a:solidFill>
@@ -2569,7 +2586,7 @@
             </a:ln>
             <a:extLst>
               <a:ext uri="{91240B29-F687-4f45-9708-019B960494DF}">
-                <a14:hiddenLine xmlns="" xmlns:a14="http://schemas.microsoft.com/office/drawing/2010/main" w="9525">
+                <a14:hiddenLine xmlns:a14="http://schemas.microsoft.com/office/drawing/2010/main" xmlns="" w="9525">
                   <a:solidFill>
                     <a:srgbClr val="000000"/>
                   </a:solidFill>
@@ -2631,7 +2648,7 @@
             </a:ln>
             <a:extLst>
               <a:ext uri="{91240B29-F687-4f45-9708-019B960494DF}">
-                <a14:hiddenLine xmlns="" xmlns:a14="http://schemas.microsoft.com/office/drawing/2010/main" w="9525">
+                <a14:hiddenLine xmlns:a14="http://schemas.microsoft.com/office/drawing/2010/main" xmlns="" w="9525">
                   <a:solidFill>
                     <a:srgbClr val="000000"/>
                   </a:solidFill>
@@ -2721,7 +2738,7 @@
             </a:ln>
             <a:extLst>
               <a:ext uri="{91240B29-F687-4f45-9708-019B960494DF}">
-                <a14:hiddenLine xmlns="" xmlns:a14="http://schemas.microsoft.com/office/drawing/2010/main" w="9525">
+                <a14:hiddenLine xmlns:a14="http://schemas.microsoft.com/office/drawing/2010/main" xmlns="" w="9525">
                   <a:solidFill>
                     <a:srgbClr val="000000"/>
                   </a:solidFill>
@@ -2789,7 +2806,7 @@
             </a:ln>
             <a:extLst>
               <a:ext uri="{91240B29-F687-4f45-9708-019B960494DF}">
-                <a14:hiddenLine xmlns="" xmlns:a14="http://schemas.microsoft.com/office/drawing/2010/main" w="9525">
+                <a14:hiddenLine xmlns:a14="http://schemas.microsoft.com/office/drawing/2010/main" xmlns="" w="9525">
                   <a:solidFill>
                     <a:srgbClr val="000000"/>
                   </a:solidFill>
@@ -2851,7 +2868,7 @@
             </a:ln>
             <a:extLst>
               <a:ext uri="{91240B29-F687-4f45-9708-019B960494DF}">
-                <a14:hiddenLine xmlns="" xmlns:a14="http://schemas.microsoft.com/office/drawing/2010/main" w="9525">
+                <a14:hiddenLine xmlns:a14="http://schemas.microsoft.com/office/drawing/2010/main" xmlns="" w="9525">
                   <a:solidFill>
                     <a:srgbClr val="000000"/>
                   </a:solidFill>
@@ -2941,7 +2958,7 @@
             </a:ln>
             <a:extLst>
               <a:ext uri="{91240B29-F687-4f45-9708-019B960494DF}">
-                <a14:hiddenLine xmlns="" xmlns:a14="http://schemas.microsoft.com/office/drawing/2010/main" w="9525">
+                <a14:hiddenLine xmlns:a14="http://schemas.microsoft.com/office/drawing/2010/main" xmlns="" w="9525">
                   <a:solidFill>
                     <a:srgbClr val="000000"/>
                   </a:solidFill>
@@ -3003,7 +3020,7 @@
             </a:ln>
             <a:extLst>
               <a:ext uri="{91240B29-F687-4f45-9708-019B960494DF}">
-                <a14:hiddenLine xmlns="" xmlns:a14="http://schemas.microsoft.com/office/drawing/2010/main" w="9525">
+                <a14:hiddenLine xmlns:a14="http://schemas.microsoft.com/office/drawing/2010/main" xmlns="" w="9525">
                   <a:solidFill>
                     <a:srgbClr val="000000"/>
                   </a:solidFill>
@@ -3093,7 +3110,7 @@
             </a:ln>
             <a:extLst>
               <a:ext uri="{91240B29-F687-4f45-9708-019B960494DF}">
-                <a14:hiddenLine xmlns="" xmlns:a14="http://schemas.microsoft.com/office/drawing/2010/main" w="9525">
+                <a14:hiddenLine xmlns:a14="http://schemas.microsoft.com/office/drawing/2010/main" xmlns="" w="9525">
                   <a:solidFill>
                     <a:srgbClr val="000000"/>
                   </a:solidFill>
@@ -3155,7 +3172,7 @@
             </a:ln>
             <a:extLst>
               <a:ext uri="{91240B29-F687-4f45-9708-019B960494DF}">
-                <a14:hiddenLine xmlns="" xmlns:a14="http://schemas.microsoft.com/office/drawing/2010/main" w="9525">
+                <a14:hiddenLine xmlns:a14="http://schemas.microsoft.com/office/drawing/2010/main" xmlns="" w="9525">
                   <a:solidFill>
                     <a:srgbClr val="000000"/>
                   </a:solidFill>
@@ -3245,7 +3262,7 @@
             </a:ln>
             <a:extLst>
               <a:ext uri="{91240B29-F687-4f45-9708-019B960494DF}">
-                <a14:hiddenLine xmlns="" xmlns:a14="http://schemas.microsoft.com/office/drawing/2010/main" w="9525">
+                <a14:hiddenLine xmlns:a14="http://schemas.microsoft.com/office/drawing/2010/main" xmlns="" w="9525">
                   <a:solidFill>
                     <a:srgbClr val="000000"/>
                   </a:solidFill>
@@ -3279,7 +3296,7 @@
             </a:ln>
             <a:extLst>
               <a:ext uri="{91240B29-F687-4f45-9708-019B960494DF}">
-                <a14:hiddenLine xmlns="" xmlns:a14="http://schemas.microsoft.com/office/drawing/2010/main" w="9525">
+                <a14:hiddenLine xmlns:a14="http://schemas.microsoft.com/office/drawing/2010/main" xmlns="" w="9525">
                   <a:solidFill>
                     <a:srgbClr val="000000"/>
                   </a:solidFill>
@@ -3344,7 +3361,7 @@
             </a:ln>
             <a:extLst>
               <a:ext uri="{91240B29-F687-4f45-9708-019B960494DF}">
-                <a14:hiddenLine xmlns="" xmlns:a14="http://schemas.microsoft.com/office/drawing/2010/main" w="9525">
+                <a14:hiddenLine xmlns:a14="http://schemas.microsoft.com/office/drawing/2010/main" xmlns="" w="9525">
                   <a:solidFill>
                     <a:srgbClr val="000000"/>
                   </a:solidFill>
@@ -3434,7 +3451,7 @@
             </a:ln>
             <a:extLst>
               <a:ext uri="{91240B29-F687-4f45-9708-019B960494DF}">
-                <a14:hiddenLine xmlns="" xmlns:a14="http://schemas.microsoft.com/office/drawing/2010/main" w="9525">
+                <a14:hiddenLine xmlns:a14="http://schemas.microsoft.com/office/drawing/2010/main" xmlns="" w="9525">
                   <a:solidFill>
                     <a:srgbClr val="000000"/>
                   </a:solidFill>
@@ -3496,7 +3513,7 @@
             </a:ln>
             <a:extLst>
               <a:ext uri="{91240B29-F687-4f45-9708-019B960494DF}">
-                <a14:hiddenLine xmlns="" xmlns:a14="http://schemas.microsoft.com/office/drawing/2010/main" w="9525">
+                <a14:hiddenLine xmlns:a14="http://schemas.microsoft.com/office/drawing/2010/main" xmlns="" w="9525">
                   <a:solidFill>
                     <a:srgbClr val="000000"/>
                   </a:solidFill>
@@ -3586,7 +3603,7 @@
             </a:ln>
             <a:extLst>
               <a:ext uri="{91240B29-F687-4f45-9708-019B960494DF}">
-                <a14:hiddenLine xmlns="" xmlns:a14="http://schemas.microsoft.com/office/drawing/2010/main" w="9525">
+                <a14:hiddenLine xmlns:a14="http://schemas.microsoft.com/office/drawing/2010/main" xmlns="" w="9525">
                   <a:solidFill>
                     <a:srgbClr val="000000"/>
                   </a:solidFill>
@@ -3676,7 +3693,7 @@
             </a:ln>
             <a:extLst>
               <a:ext uri="{91240B29-F687-4f45-9708-019B960494DF}">
-                <a14:hiddenLine xmlns="" xmlns:a14="http://schemas.microsoft.com/office/drawing/2010/main" w="9525">
+                <a14:hiddenLine xmlns:a14="http://schemas.microsoft.com/office/drawing/2010/main" xmlns="" w="9525">
                   <a:solidFill>
                     <a:srgbClr val="000000"/>
                   </a:solidFill>
@@ -3741,7 +3758,7 @@
             </a:ln>
             <a:extLst>
               <a:ext uri="{91240B29-F687-4f45-9708-019B960494DF}">
-                <a14:hiddenLine xmlns="" xmlns:a14="http://schemas.microsoft.com/office/drawing/2010/main" w="9525">
+                <a14:hiddenLine xmlns:a14="http://schemas.microsoft.com/office/drawing/2010/main" xmlns="" w="9525">
                   <a:solidFill>
                     <a:srgbClr val="000000"/>
                   </a:solidFill>
@@ -3803,7 +3820,7 @@
             </a:ln>
             <a:extLst>
               <a:ext uri="{91240B29-F687-4f45-9708-019B960494DF}">
-                <a14:hiddenLine xmlns="" xmlns:a14="http://schemas.microsoft.com/office/drawing/2010/main" w="9525">
+                <a14:hiddenLine xmlns:a14="http://schemas.microsoft.com/office/drawing/2010/main" xmlns="" w="9525">
                   <a:solidFill>
                     <a:srgbClr val="000000"/>
                   </a:solidFill>
@@ -3893,7 +3910,7 @@
             </a:ln>
             <a:extLst>
               <a:ext uri="{91240B29-F687-4f45-9708-019B960494DF}">
-                <a14:hiddenLine xmlns="" xmlns:a14="http://schemas.microsoft.com/office/drawing/2010/main" w="9525">
+                <a14:hiddenLine xmlns:a14="http://schemas.microsoft.com/office/drawing/2010/main" xmlns="" w="9525">
                   <a:solidFill>
                     <a:srgbClr val="000000"/>
                   </a:solidFill>
@@ -3983,7 +4000,7 @@
             </a:ln>
             <a:extLst>
               <a:ext uri="{91240B29-F687-4f45-9708-019B960494DF}">
-                <a14:hiddenLine xmlns="" xmlns:a14="http://schemas.microsoft.com/office/drawing/2010/main" w="9525">
+                <a14:hiddenLine xmlns:a14="http://schemas.microsoft.com/office/drawing/2010/main" xmlns="" w="9525">
                   <a:solidFill>
                     <a:srgbClr val="000000"/>
                   </a:solidFill>
@@ -4045,7 +4062,7 @@
             </a:ln>
             <a:extLst>
               <a:ext uri="{91240B29-F687-4f45-9708-019B960494DF}">
-                <a14:hiddenLine xmlns="" xmlns:a14="http://schemas.microsoft.com/office/drawing/2010/main" w="9525">
+                <a14:hiddenLine xmlns:a14="http://schemas.microsoft.com/office/drawing/2010/main" xmlns="" w="9525">
                   <a:solidFill>
                     <a:srgbClr val="000000"/>
                   </a:solidFill>
@@ -4165,7 +4182,7 @@
             </a:ln>
             <a:extLst>
               <a:ext uri="{91240B29-F687-4f45-9708-019B960494DF}">
-                <a14:hiddenLine xmlns="" xmlns:a14="http://schemas.microsoft.com/office/drawing/2010/main" w="9525">
+                <a14:hiddenLine xmlns:a14="http://schemas.microsoft.com/office/drawing/2010/main" xmlns="" w="9525">
                   <a:solidFill>
                     <a:srgbClr val="000000"/>
                   </a:solidFill>
@@ -4233,7 +4250,7 @@
             </a:ln>
             <a:extLst>
               <a:ext uri="{91240B29-F687-4f45-9708-019B960494DF}">
-                <a14:hiddenLine xmlns="" xmlns:a14="http://schemas.microsoft.com/office/drawing/2010/main" w="9525">
+                <a14:hiddenLine xmlns:a14="http://schemas.microsoft.com/office/drawing/2010/main" xmlns="" w="9525">
                   <a:solidFill>
                     <a:srgbClr val="000000"/>
                   </a:solidFill>
@@ -4323,7 +4340,7 @@
             </a:ln>
             <a:extLst>
               <a:ext uri="{91240B29-F687-4f45-9708-019B960494DF}">
-                <a14:hiddenLine xmlns="" xmlns:a14="http://schemas.microsoft.com/office/drawing/2010/main" w="9525">
+                <a14:hiddenLine xmlns:a14="http://schemas.microsoft.com/office/drawing/2010/main" xmlns="" w="9525">
                   <a:solidFill>
                     <a:srgbClr val="000000"/>
                   </a:solidFill>
@@ -4464,7 +4481,7 @@
             <a:fld id="{B61BEF0D-F0BB-DE4B-95CE-6DB70DBA9567}" type="datetimeFigureOut">
               <a:rPr lang="en-US" smtClean="0"/>
               <a:pPr/>
-              <a:t>9/12/19</a:t>
+              <a:t>9/13/19</a:t>
             </a:fld>
             <a:endParaRPr lang="en-US" dirty="0"/>
           </a:p>
@@ -4733,7 +4750,7 @@
             <a:fld id="{B61BEF0D-F0BB-DE4B-95CE-6DB70DBA9567}" type="datetimeFigureOut">
               <a:rPr lang="en-US" smtClean="0"/>
               <a:pPr/>
-              <a:t>9/12/19</a:t>
+              <a:t>9/13/19</a:t>
             </a:fld>
             <a:endParaRPr lang="en-US" dirty="0"/>
           </a:p>
@@ -4931,7 +4948,7 @@
             <a:fld id="{B61BEF0D-F0BB-DE4B-95CE-6DB70DBA9567}" type="datetimeFigureOut">
               <a:rPr lang="en-US" smtClean="0"/>
               <a:pPr/>
-              <a:t>9/12/19</a:t>
+              <a:t>9/13/19</a:t>
             </a:fld>
             <a:endParaRPr lang="en-US" dirty="0"/>
           </a:p>
@@ -5196,7 +5213,7 @@
             <a:fld id="{B61BEF0D-F0BB-DE4B-95CE-6DB70DBA9567}" type="datetimeFigureOut">
               <a:rPr lang="en-US" smtClean="0"/>
               <a:pPr/>
-              <a:t>9/12/19</a:t>
+              <a:t>9/13/19</a:t>
             </a:fld>
             <a:endParaRPr lang="en-US" dirty="0"/>
           </a:p>
@@ -5632,7 +5649,7 @@
             <a:fld id="{B61BEF0D-F0BB-DE4B-95CE-6DB70DBA9567}" type="datetimeFigureOut">
               <a:rPr lang="en-US" smtClean="0"/>
               <a:pPr/>
-              <a:t>9/12/19</a:t>
+              <a:t>9/13/19</a:t>
             </a:fld>
             <a:endParaRPr lang="en-US" dirty="0"/>
           </a:p>
@@ -6180,7 +6197,7 @@
             <a:fld id="{B61BEF0D-F0BB-DE4B-95CE-6DB70DBA9567}" type="datetimeFigureOut">
               <a:rPr lang="en-US" smtClean="0"/>
               <a:pPr/>
-              <a:t>9/12/19</a:t>
+              <a:t>9/13/19</a:t>
             </a:fld>
             <a:endParaRPr lang="en-US" dirty="0"/>
           </a:p>
@@ -6902,7 +6919,7 @@
             <a:fld id="{B61BEF0D-F0BB-DE4B-95CE-6DB70DBA9567}" type="datetimeFigureOut">
               <a:rPr lang="en-US" smtClean="0"/>
               <a:pPr/>
-              <a:t>9/12/19</a:t>
+              <a:t>9/13/19</a:t>
             </a:fld>
             <a:endParaRPr lang="en-US" dirty="0"/>
           </a:p>
@@ -7074,7 +7091,7 @@
             <a:fld id="{B61BEF0D-F0BB-DE4B-95CE-6DB70DBA9567}" type="datetimeFigureOut">
               <a:rPr lang="en-US" smtClean="0"/>
               <a:pPr/>
-              <a:t>9/12/19</a:t>
+              <a:t>9/13/19</a:t>
             </a:fld>
             <a:endParaRPr lang="en-US" dirty="0"/>
           </a:p>
@@ -7256,7 +7273,7 @@
             <a:fld id="{B61BEF0D-F0BB-DE4B-95CE-6DB70DBA9567}" type="datetimeFigureOut">
               <a:rPr lang="en-US" smtClean="0"/>
               <a:pPr/>
-              <a:t>9/12/19</a:t>
+              <a:t>9/13/19</a:t>
             </a:fld>
             <a:endParaRPr lang="en-US" dirty="0"/>
           </a:p>
@@ -7445,7 +7462,7 @@
             <a:fld id="{B61BEF0D-F0BB-DE4B-95CE-6DB70DBA9567}" type="datetimeFigureOut">
               <a:rPr lang="en-US" smtClean="0"/>
               <a:pPr/>
-              <a:t>9/12/19</a:t>
+              <a:t>9/13/19</a:t>
             </a:fld>
             <a:endParaRPr lang="en-US" dirty="0"/>
           </a:p>
@@ -7697,7 +7714,7 @@
             <a:fld id="{B61BEF0D-F0BB-DE4B-95CE-6DB70DBA9567}" type="datetimeFigureOut">
               <a:rPr lang="en-US" smtClean="0"/>
               <a:pPr/>
-              <a:t>9/12/19</a:t>
+              <a:t>9/13/19</a:t>
             </a:fld>
             <a:endParaRPr lang="en-US" dirty="0"/>
           </a:p>
@@ -7931,7 +7948,7 @@
             <a:fld id="{B61BEF0D-F0BB-DE4B-95CE-6DB70DBA9567}" type="datetimeFigureOut">
               <a:rPr lang="en-US" smtClean="0"/>
               <a:pPr/>
-              <a:t>9/12/19</a:t>
+              <a:t>9/13/19</a:t>
             </a:fld>
             <a:endParaRPr lang="en-US" dirty="0"/>
           </a:p>
@@ -8318,7 +8335,7 @@
             <a:fld id="{B61BEF0D-F0BB-DE4B-95CE-6DB70DBA9567}" type="datetimeFigureOut">
               <a:rPr lang="en-US" smtClean="0"/>
               <a:pPr/>
-              <a:t>9/12/19</a:t>
+              <a:t>9/13/19</a:t>
             </a:fld>
             <a:endParaRPr lang="en-US" dirty="0"/>
           </a:p>
@@ -8438,7 +8455,7 @@
             <a:fld id="{B61BEF0D-F0BB-DE4B-95CE-6DB70DBA9567}" type="datetimeFigureOut">
               <a:rPr lang="en-US" smtClean="0"/>
               <a:pPr/>
-              <a:t>9/12/19</a:t>
+              <a:t>9/13/19</a:t>
             </a:fld>
             <a:endParaRPr lang="en-US" dirty="0"/>
           </a:p>
@@ -8535,7 +8552,7 @@
             <a:fld id="{B61BEF0D-F0BB-DE4B-95CE-6DB70DBA9567}" type="datetimeFigureOut">
               <a:rPr lang="en-US" smtClean="0"/>
               <a:pPr/>
-              <a:t>9/12/19</a:t>
+              <a:t>9/13/19</a:t>
             </a:fld>
             <a:endParaRPr lang="en-US" dirty="0"/>
           </a:p>
@@ -8786,7 +8803,7 @@
             <a:fld id="{B61BEF0D-F0BB-DE4B-95CE-6DB70DBA9567}" type="datetimeFigureOut">
               <a:rPr lang="en-US" smtClean="0"/>
               <a:pPr/>
-              <a:t>9/12/19</a:t>
+              <a:t>9/13/19</a:t>
             </a:fld>
             <a:endParaRPr lang="en-US" dirty="0"/>
           </a:p>
@@ -9073,7 +9090,7 @@
             <a:fld id="{B61BEF0D-F0BB-DE4B-95CE-6DB70DBA9567}" type="datetimeFigureOut">
               <a:rPr lang="en-US" smtClean="0"/>
               <a:pPr/>
-              <a:t>9/12/19</a:t>
+              <a:t>9/13/19</a:t>
             </a:fld>
             <a:endParaRPr lang="en-US" dirty="0"/>
           </a:p>
@@ -9197,7 +9214,7 @@
           <a:noFill/>
           <a:extLst>
             <a:ext uri="{909E8E84-426E-40dd-AFC4-6F175D3DCCD1}">
-              <a14:hiddenFill xmlns="" xmlns:a14="http://schemas.microsoft.com/office/drawing/2010/main">
+              <a14:hiddenFill xmlns:a14="http://schemas.microsoft.com/office/drawing/2010/main" xmlns="">
                 <a:solidFill>
                   <a:srgbClr val="FFFFFF"/>
                 </a:solidFill>
@@ -9271,7 +9288,7 @@
               </a:ln>
               <a:extLst>
                 <a:ext uri="{91240B29-F687-4f45-9708-019B960494DF}">
-                  <a14:hiddenLine xmlns="" xmlns:a14="http://schemas.microsoft.com/office/drawing/2010/main" w="9525">
+                  <a14:hiddenLine xmlns:a14="http://schemas.microsoft.com/office/drawing/2010/main" xmlns="" w="9525">
                     <a:solidFill>
                       <a:srgbClr val="000000"/>
                     </a:solidFill>
@@ -9361,7 +9378,7 @@
               </a:ln>
               <a:extLst>
                 <a:ext uri="{91240B29-F687-4f45-9708-019B960494DF}">
-                  <a14:hiddenLine xmlns="" xmlns:a14="http://schemas.microsoft.com/office/drawing/2010/main" w="9525">
+                  <a14:hiddenLine xmlns:a14="http://schemas.microsoft.com/office/drawing/2010/main" xmlns="" w="9525">
                     <a:solidFill>
                       <a:srgbClr val="000000"/>
                     </a:solidFill>
@@ -9451,7 +9468,7 @@
               </a:ln>
               <a:extLst>
                 <a:ext uri="{91240B29-F687-4f45-9708-019B960494DF}">
-                  <a14:hiddenLine xmlns="" xmlns:a14="http://schemas.microsoft.com/office/drawing/2010/main" w="9525">
+                  <a14:hiddenLine xmlns:a14="http://schemas.microsoft.com/office/drawing/2010/main" xmlns="" w="9525">
                     <a:solidFill>
                       <a:srgbClr val="000000"/>
                     </a:solidFill>
@@ -9513,7 +9530,7 @@
               </a:ln>
               <a:extLst>
                 <a:ext uri="{91240B29-F687-4f45-9708-019B960494DF}">
-                  <a14:hiddenLine xmlns="" xmlns:a14="http://schemas.microsoft.com/office/drawing/2010/main" w="9525">
+                  <a14:hiddenLine xmlns:a14="http://schemas.microsoft.com/office/drawing/2010/main" xmlns="" w="9525">
                     <a:solidFill>
                       <a:srgbClr val="000000"/>
                     </a:solidFill>
@@ -9603,7 +9620,7 @@
               </a:ln>
               <a:extLst>
                 <a:ext uri="{91240B29-F687-4f45-9708-019B960494DF}">
-                  <a14:hiddenLine xmlns="" xmlns:a14="http://schemas.microsoft.com/office/drawing/2010/main" w="9525">
+                  <a14:hiddenLine xmlns:a14="http://schemas.microsoft.com/office/drawing/2010/main" xmlns="" w="9525">
                     <a:solidFill>
                       <a:srgbClr val="000000"/>
                     </a:solidFill>
@@ -9665,7 +9682,7 @@
               </a:ln>
               <a:extLst>
                 <a:ext uri="{91240B29-F687-4f45-9708-019B960494DF}">
-                  <a14:hiddenLine xmlns="" xmlns:a14="http://schemas.microsoft.com/office/drawing/2010/main" w="9525">
+                  <a14:hiddenLine xmlns:a14="http://schemas.microsoft.com/office/drawing/2010/main" xmlns="" w="9525">
                     <a:solidFill>
                       <a:srgbClr val="000000"/>
                     </a:solidFill>
@@ -9727,7 +9744,7 @@
               </a:ln>
               <a:extLst>
                 <a:ext uri="{91240B29-F687-4f45-9708-019B960494DF}">
-                  <a14:hiddenLine xmlns="" xmlns:a14="http://schemas.microsoft.com/office/drawing/2010/main" w="9525">
+                  <a14:hiddenLine xmlns:a14="http://schemas.microsoft.com/office/drawing/2010/main" xmlns="" w="9525">
                     <a:solidFill>
                       <a:srgbClr val="000000"/>
                     </a:solidFill>
@@ -9817,7 +9834,7 @@
               </a:ln>
               <a:extLst>
                 <a:ext uri="{91240B29-F687-4f45-9708-019B960494DF}">
-                  <a14:hiddenLine xmlns="" xmlns:a14="http://schemas.microsoft.com/office/drawing/2010/main" w="9525">
+                  <a14:hiddenLine xmlns:a14="http://schemas.microsoft.com/office/drawing/2010/main" xmlns="" w="9525">
                     <a:solidFill>
                       <a:srgbClr val="000000"/>
                     </a:solidFill>
@@ -9907,7 +9924,7 @@
               </a:ln>
               <a:extLst>
                 <a:ext uri="{91240B29-F687-4f45-9708-019B960494DF}">
-                  <a14:hiddenLine xmlns="" xmlns:a14="http://schemas.microsoft.com/office/drawing/2010/main" w="9525">
+                  <a14:hiddenLine xmlns:a14="http://schemas.microsoft.com/office/drawing/2010/main" xmlns="" w="9525">
                     <a:solidFill>
                       <a:srgbClr val="000000"/>
                     </a:solidFill>
@@ -9969,7 +9986,7 @@
               </a:ln>
               <a:extLst>
                 <a:ext uri="{91240B29-F687-4f45-9708-019B960494DF}">
-                  <a14:hiddenLine xmlns="" xmlns:a14="http://schemas.microsoft.com/office/drawing/2010/main" w="9525">
+                  <a14:hiddenLine xmlns:a14="http://schemas.microsoft.com/office/drawing/2010/main" xmlns="" w="9525">
                     <a:solidFill>
                       <a:srgbClr val="000000"/>
                     </a:solidFill>
@@ -10079,7 +10096,7 @@
               </a:ln>
               <a:extLst>
                 <a:ext uri="{91240B29-F687-4f45-9708-019B960494DF}">
-                  <a14:hiddenLine xmlns="" xmlns:a14="http://schemas.microsoft.com/office/drawing/2010/main" w="9525">
+                  <a14:hiddenLine xmlns:a14="http://schemas.microsoft.com/office/drawing/2010/main" xmlns="" w="9525">
                     <a:solidFill>
                       <a:srgbClr val="000000"/>
                     </a:solidFill>
@@ -10163,7 +10180,7 @@
               </a:ln>
               <a:extLst>
                 <a:ext uri="{91240B29-F687-4f45-9708-019B960494DF}">
-                  <a14:hiddenLine xmlns="" xmlns:a14="http://schemas.microsoft.com/office/drawing/2010/main" w="9525">
+                  <a14:hiddenLine xmlns:a14="http://schemas.microsoft.com/office/drawing/2010/main" xmlns="" w="9525">
                     <a:solidFill>
                       <a:srgbClr val="000000"/>
                     </a:solidFill>
@@ -10225,7 +10242,7 @@
               </a:ln>
               <a:extLst>
                 <a:ext uri="{91240B29-F687-4f45-9708-019B960494DF}">
-                  <a14:hiddenLine xmlns="" xmlns:a14="http://schemas.microsoft.com/office/drawing/2010/main" w="9525">
+                  <a14:hiddenLine xmlns:a14="http://schemas.microsoft.com/office/drawing/2010/main" xmlns="" w="9525">
                     <a:solidFill>
                       <a:srgbClr val="000000"/>
                     </a:solidFill>
@@ -10287,7 +10304,7 @@
               </a:ln>
               <a:extLst>
                 <a:ext uri="{91240B29-F687-4f45-9708-019B960494DF}">
-                  <a14:hiddenLine xmlns="" xmlns:a14="http://schemas.microsoft.com/office/drawing/2010/main" w="9525">
+                  <a14:hiddenLine xmlns:a14="http://schemas.microsoft.com/office/drawing/2010/main" xmlns="" w="9525">
                     <a:solidFill>
                       <a:srgbClr val="000000"/>
                     </a:solidFill>
@@ -10377,7 +10394,7 @@
               </a:ln>
               <a:extLst>
                 <a:ext uri="{91240B29-F687-4f45-9708-019B960494DF}">
-                  <a14:hiddenLine xmlns="" xmlns:a14="http://schemas.microsoft.com/office/drawing/2010/main" w="9525">
+                  <a14:hiddenLine xmlns:a14="http://schemas.microsoft.com/office/drawing/2010/main" xmlns="" w="9525">
                     <a:solidFill>
                       <a:srgbClr val="000000"/>
                     </a:solidFill>
@@ -10411,7 +10428,7 @@
               </a:ln>
               <a:extLst>
                 <a:ext uri="{91240B29-F687-4f45-9708-019B960494DF}">
-                  <a14:hiddenLine xmlns="" xmlns:a14="http://schemas.microsoft.com/office/drawing/2010/main" w="9525">
+                  <a14:hiddenLine xmlns:a14="http://schemas.microsoft.com/office/drawing/2010/main" xmlns="" w="9525">
                     <a:solidFill>
                       <a:srgbClr val="000000"/>
                     </a:solidFill>
@@ -10476,7 +10493,7 @@
               </a:ln>
               <a:extLst>
                 <a:ext uri="{91240B29-F687-4f45-9708-019B960494DF}">
-                  <a14:hiddenLine xmlns="" xmlns:a14="http://schemas.microsoft.com/office/drawing/2010/main" w="9525">
+                  <a14:hiddenLine xmlns:a14="http://schemas.microsoft.com/office/drawing/2010/main" xmlns="" w="9525">
                     <a:solidFill>
                       <a:srgbClr val="000000"/>
                     </a:solidFill>
@@ -10566,7 +10583,7 @@
               </a:ln>
               <a:extLst>
                 <a:ext uri="{91240B29-F687-4f45-9708-019B960494DF}">
-                  <a14:hiddenLine xmlns="" xmlns:a14="http://schemas.microsoft.com/office/drawing/2010/main" w="9525">
+                  <a14:hiddenLine xmlns:a14="http://schemas.microsoft.com/office/drawing/2010/main" xmlns="" w="9525">
                     <a:solidFill>
                       <a:srgbClr val="000000"/>
                     </a:solidFill>
@@ -10628,7 +10645,7 @@
               </a:ln>
               <a:extLst>
                 <a:ext uri="{91240B29-F687-4f45-9708-019B960494DF}">
-                  <a14:hiddenLine xmlns="" xmlns:a14="http://schemas.microsoft.com/office/drawing/2010/main" w="9525">
+                  <a14:hiddenLine xmlns:a14="http://schemas.microsoft.com/office/drawing/2010/main" xmlns="" w="9525">
                     <a:solidFill>
                       <a:srgbClr val="000000"/>
                     </a:solidFill>
@@ -10718,7 +10735,7 @@
               </a:ln>
               <a:extLst>
                 <a:ext uri="{91240B29-F687-4f45-9708-019B960494DF}">
-                  <a14:hiddenLine xmlns="" xmlns:a14="http://schemas.microsoft.com/office/drawing/2010/main" w="9525">
+                  <a14:hiddenLine xmlns:a14="http://schemas.microsoft.com/office/drawing/2010/main" xmlns="" w="9525">
                     <a:solidFill>
                       <a:srgbClr val="000000"/>
                     </a:solidFill>
@@ -10783,7 +10800,7 @@
               </a:ln>
               <a:extLst>
                 <a:ext uri="{91240B29-F687-4f45-9708-019B960494DF}">
-                  <a14:hiddenLine xmlns="" xmlns:a14="http://schemas.microsoft.com/office/drawing/2010/main" w="9525">
+                  <a14:hiddenLine xmlns:a14="http://schemas.microsoft.com/office/drawing/2010/main" xmlns="" w="9525">
                     <a:solidFill>
                       <a:srgbClr val="000000"/>
                     </a:solidFill>
@@ -10845,7 +10862,7 @@
               </a:ln>
               <a:extLst>
                 <a:ext uri="{91240B29-F687-4f45-9708-019B960494DF}">
-                  <a14:hiddenLine xmlns="" xmlns:a14="http://schemas.microsoft.com/office/drawing/2010/main" w="9525">
+                  <a14:hiddenLine xmlns:a14="http://schemas.microsoft.com/office/drawing/2010/main" xmlns="" w="9525">
                     <a:solidFill>
                       <a:srgbClr val="000000"/>
                     </a:solidFill>
@@ -10935,7 +10952,7 @@
               </a:ln>
               <a:extLst>
                 <a:ext uri="{91240B29-F687-4f45-9708-019B960494DF}">
-                  <a14:hiddenLine xmlns="" xmlns:a14="http://schemas.microsoft.com/office/drawing/2010/main" w="9525">
+                  <a14:hiddenLine xmlns:a14="http://schemas.microsoft.com/office/drawing/2010/main" xmlns="" w="9525">
                     <a:solidFill>
                       <a:srgbClr val="000000"/>
                     </a:solidFill>
@@ -11025,7 +11042,7 @@
               </a:ln>
               <a:extLst>
                 <a:ext uri="{91240B29-F687-4f45-9708-019B960494DF}">
-                  <a14:hiddenLine xmlns="" xmlns:a14="http://schemas.microsoft.com/office/drawing/2010/main" w="9525">
+                  <a14:hiddenLine xmlns:a14="http://schemas.microsoft.com/office/drawing/2010/main" xmlns="" w="9525">
                     <a:solidFill>
                       <a:srgbClr val="000000"/>
                     </a:solidFill>
@@ -11090,7 +11107,7 @@
               </a:ln>
               <a:extLst>
                 <a:ext uri="{91240B29-F687-4f45-9708-019B960494DF}">
-                  <a14:hiddenLine xmlns="" xmlns:a14="http://schemas.microsoft.com/office/drawing/2010/main" w="9525">
+                  <a14:hiddenLine xmlns:a14="http://schemas.microsoft.com/office/drawing/2010/main" xmlns="" w="9525">
                     <a:solidFill>
                       <a:srgbClr val="000000"/>
                     </a:solidFill>
@@ -11210,7 +11227,7 @@
               </a:ln>
               <a:extLst>
                 <a:ext uri="{91240B29-F687-4f45-9708-019B960494DF}">
-                  <a14:hiddenLine xmlns="" xmlns:a14="http://schemas.microsoft.com/office/drawing/2010/main" w="9525">
+                  <a14:hiddenLine xmlns:a14="http://schemas.microsoft.com/office/drawing/2010/main" xmlns="" w="9525">
                     <a:solidFill>
                       <a:srgbClr val="000000"/>
                     </a:solidFill>
@@ -11291,7 +11308,7 @@
               </a:ln>
               <a:extLst>
                 <a:ext uri="{91240B29-F687-4f45-9708-019B960494DF}">
-                  <a14:hiddenLine xmlns="" xmlns:a14="http://schemas.microsoft.com/office/drawing/2010/main" w="9525">
+                  <a14:hiddenLine xmlns:a14="http://schemas.microsoft.com/office/drawing/2010/main" xmlns="" w="9525">
                     <a:solidFill>
                       <a:srgbClr val="000000"/>
                     </a:solidFill>
@@ -11406,7 +11423,7 @@
               </a:ln>
               <a:extLst>
                 <a:ext uri="{91240B29-F687-4f45-9708-019B960494DF}">
-                  <a14:hiddenLine xmlns="" xmlns:a14="http://schemas.microsoft.com/office/drawing/2010/main" w="9525">
+                  <a14:hiddenLine xmlns:a14="http://schemas.microsoft.com/office/drawing/2010/main" xmlns="" w="9525">
                     <a:solidFill>
                       <a:srgbClr val="000000"/>
                     </a:solidFill>
@@ -11496,7 +11513,7 @@
               </a:ln>
               <a:extLst>
                 <a:ext uri="{91240B29-F687-4f45-9708-019B960494DF}">
-                  <a14:hiddenLine xmlns="" xmlns:a14="http://schemas.microsoft.com/office/drawing/2010/main" w="9525">
+                  <a14:hiddenLine xmlns:a14="http://schemas.microsoft.com/office/drawing/2010/main" xmlns="" w="9525">
                     <a:solidFill>
                       <a:srgbClr val="000000"/>
                     </a:solidFill>
@@ -11561,7 +11578,7 @@
               </a:ln>
               <a:extLst>
                 <a:ext uri="{91240B29-F687-4f45-9708-019B960494DF}">
-                  <a14:hiddenLine xmlns="" xmlns:a14="http://schemas.microsoft.com/office/drawing/2010/main" w="9525">
+                  <a14:hiddenLine xmlns:a14="http://schemas.microsoft.com/office/drawing/2010/main" xmlns="" w="9525">
                     <a:solidFill>
                       <a:srgbClr val="000000"/>
                     </a:solidFill>
@@ -11651,7 +11668,7 @@
               </a:ln>
               <a:extLst>
                 <a:ext uri="{91240B29-F687-4f45-9708-019B960494DF}">
-                  <a14:hiddenLine xmlns="" xmlns:a14="http://schemas.microsoft.com/office/drawing/2010/main" w="9525">
+                  <a14:hiddenLine xmlns:a14="http://schemas.microsoft.com/office/drawing/2010/main" xmlns="" w="9525">
                     <a:solidFill>
                       <a:srgbClr val="000000"/>
                     </a:solidFill>
@@ -11719,7 +11736,7 @@
               </a:ln>
               <a:extLst>
                 <a:ext uri="{91240B29-F687-4f45-9708-019B960494DF}">
-                  <a14:hiddenLine xmlns="" xmlns:a14="http://schemas.microsoft.com/office/drawing/2010/main" w="9525">
+                  <a14:hiddenLine xmlns:a14="http://schemas.microsoft.com/office/drawing/2010/main" xmlns="" w="9525">
                     <a:solidFill>
                       <a:srgbClr val="000000"/>
                     </a:solidFill>
@@ -11809,7 +11826,7 @@
               </a:ln>
               <a:extLst>
                 <a:ext uri="{91240B29-F687-4f45-9708-019B960494DF}">
-                  <a14:hiddenLine xmlns="" xmlns:a14="http://schemas.microsoft.com/office/drawing/2010/main" w="9525">
+                  <a14:hiddenLine xmlns:a14="http://schemas.microsoft.com/office/drawing/2010/main" xmlns="" w="9525">
                     <a:solidFill>
                       <a:srgbClr val="000000"/>
                     </a:solidFill>
@@ -11877,7 +11894,7 @@
               </a:ln>
               <a:extLst>
                 <a:ext uri="{91240B29-F687-4f45-9708-019B960494DF}">
-                  <a14:hiddenLine xmlns="" xmlns:a14="http://schemas.microsoft.com/office/drawing/2010/main" w="9525">
+                  <a14:hiddenLine xmlns:a14="http://schemas.microsoft.com/office/drawing/2010/main" xmlns="" w="9525">
                     <a:solidFill>
                       <a:srgbClr val="000000"/>
                     </a:solidFill>
@@ -11967,7 +11984,7 @@
               </a:ln>
               <a:extLst>
                 <a:ext uri="{91240B29-F687-4f45-9708-019B960494DF}">
-                  <a14:hiddenLine xmlns="" xmlns:a14="http://schemas.microsoft.com/office/drawing/2010/main" w="9525">
+                  <a14:hiddenLine xmlns:a14="http://schemas.microsoft.com/office/drawing/2010/main" xmlns="" w="9525">
                     <a:solidFill>
                       <a:srgbClr val="000000"/>
                     </a:solidFill>
@@ -12001,7 +12018,7 @@
               </a:ln>
               <a:extLst>
                 <a:ext uri="{91240B29-F687-4f45-9708-019B960494DF}">
-                  <a14:hiddenLine xmlns="" xmlns:a14="http://schemas.microsoft.com/office/drawing/2010/main" w="9525">
+                  <a14:hiddenLine xmlns:a14="http://schemas.microsoft.com/office/drawing/2010/main" xmlns="" w="9525">
                     <a:solidFill>
                       <a:srgbClr val="000000"/>
                     </a:solidFill>
@@ -12141,7 +12158,7 @@
             <a:fld id="{B61BEF0D-F0BB-DE4B-95CE-6DB70DBA9567}" type="datetimeFigureOut">
               <a:rPr lang="en-US" smtClean="0"/>
               <a:pPr/>
-              <a:t>9/12/19</a:t>
+              <a:t>9/13/19</a:t>
             </a:fld>
             <a:endParaRPr lang="en-US" dirty="0"/>
           </a:p>
@@ -19786,6 +19803,1373 @@
 </p:sld>
 </file>
 
+<file path=ppt/slides/slide60.xml><?xml version="1.0" encoding="utf-8"?>
+<p:sld xmlns:a="http://schemas.openxmlformats.org/drawingml/2006/main" xmlns:r="http://schemas.openxmlformats.org/officeDocument/2006/relationships" xmlns:p="http://schemas.openxmlformats.org/presentationml/2006/main">
+  <p:cSld>
+    <p:spTree>
+      <p:nvGrpSpPr>
+        <p:cNvPr id="1" name=""/>
+        <p:cNvGrpSpPr/>
+        <p:nvPr/>
+      </p:nvGrpSpPr>
+      <p:grpSpPr>
+        <a:xfrm>
+          <a:off x="0" y="0"/>
+          <a:ext cx="0" cy="0"/>
+          <a:chOff x="0" y="0"/>
+          <a:chExt cx="0" cy="0"/>
+        </a:xfrm>
+      </p:grpSpPr>
+      <p:sp>
+        <p:nvSpPr>
+          <p:cNvPr id="2" name="Title 1">
+            <a:extLst>
+              <a:ext uri="{FF2B5EF4-FFF2-40B4-BE49-F238E27FC236}">
+                <a16:creationId xmlns:a16="http://schemas.microsoft.com/office/drawing/2014/main" id="{CEEA6B3B-B32A-7045-AB21-B5CF013EECE5}"/>
+              </a:ext>
+            </a:extLst>
+          </p:cNvPr>
+          <p:cNvSpPr>
+            <a:spLocks noGrp="1"/>
+          </p:cNvSpPr>
+          <p:nvPr>
+            <p:ph type="title"/>
+          </p:nvPr>
+        </p:nvSpPr>
+        <p:spPr/>
+        <p:txBody>
+          <a:bodyPr/>
+          <a:lstStyle/>
+          <a:p>
+            <a:r>
+              <a:rPr lang="en-US" dirty="0"/>
+              <a:t>Strong cohesion</a:t>
+            </a:r>
+          </a:p>
+        </p:txBody>
+      </p:sp>
+      <p:sp>
+        <p:nvSpPr>
+          <p:cNvPr id="3" name="Content Placeholder 2">
+            <a:extLst>
+              <a:ext uri="{FF2B5EF4-FFF2-40B4-BE49-F238E27FC236}">
+                <a16:creationId xmlns:a16="http://schemas.microsoft.com/office/drawing/2014/main" id="{75091B4D-22C2-2F43-BD6C-81D2D7C1BD32}"/>
+              </a:ext>
+            </a:extLst>
+          </p:cNvPr>
+          <p:cNvSpPr>
+            <a:spLocks noGrp="1"/>
+          </p:cNvSpPr>
+          <p:nvPr>
+            <p:ph idx="1"/>
+          </p:nvPr>
+        </p:nvSpPr>
+        <p:spPr/>
+        <p:txBody>
+          <a:bodyPr>
+            <a:normAutofit fontScale="92500" lnSpcReduction="20000"/>
+          </a:bodyPr>
+          <a:lstStyle/>
+          <a:p>
+            <a:pPr marL="0" indent="0">
+              <a:buNone/>
+            </a:pPr>
+            <a:r>
+              <a:rPr lang="en-US" b="1" dirty="0"/>
+              <a:t>Idea: </a:t>
+            </a:r>
+            <a:r>
+              <a:rPr lang="en-US" dirty="0"/>
+              <a:t>Favor the design with strong(</a:t>
+            </a:r>
+            <a:r>
+              <a:rPr lang="en-US" dirty="0" err="1"/>
+              <a:t>er</a:t>
+            </a:r>
+            <a:r>
+              <a:rPr lang="en-US" dirty="0"/>
+              <a:t>) cohesion</a:t>
+            </a:r>
+          </a:p>
+          <a:p>
+            <a:pPr marL="0" indent="0">
+              <a:buNone/>
+            </a:pPr>
+            <a:r>
+              <a:rPr lang="en-US" dirty="0"/>
+              <a:t>Weak cohesion may lead to code that is:</a:t>
+            </a:r>
+          </a:p>
+          <a:p>
+            <a:r>
+              <a:rPr lang="en-US" dirty="0"/>
+              <a:t>hard to comprehend</a:t>
+            </a:r>
+          </a:p>
+          <a:p>
+            <a:r>
+              <a:rPr lang="en-US" dirty="0"/>
+              <a:t>hard to reuse</a:t>
+            </a:r>
+          </a:p>
+          <a:p>
+            <a:r>
+              <a:rPr lang="en-US" dirty="0"/>
+              <a:t>hard to maintain</a:t>
+            </a:r>
+          </a:p>
+          <a:p>
+            <a:r>
+              <a:rPr lang="en-US" dirty="0"/>
+              <a:t>hard to test</a:t>
+            </a:r>
+          </a:p>
+          <a:p>
+            <a:endParaRPr lang="en-US" dirty="0"/>
+          </a:p>
+        </p:txBody>
+      </p:sp>
+    </p:spTree>
+    <p:extLst>
+      <p:ext uri="{BB962C8B-B14F-4D97-AF65-F5344CB8AC3E}">
+        <p14:creationId xmlns:p14="http://schemas.microsoft.com/office/powerpoint/2010/main" val="3780620858"/>
+      </p:ext>
+    </p:extLst>
+  </p:cSld>
+  <p:clrMapOvr>
+    <a:masterClrMapping/>
+  </p:clrMapOvr>
+</p:sld>
+</file>
+
+<file path=ppt/slides/slide61.xml><?xml version="1.0" encoding="utf-8"?>
+<p:sld xmlns:a="http://schemas.openxmlformats.org/drawingml/2006/main" xmlns:r="http://schemas.openxmlformats.org/officeDocument/2006/relationships" xmlns:p="http://schemas.openxmlformats.org/presentationml/2006/main">
+  <p:cSld>
+    <p:spTree>
+      <p:nvGrpSpPr>
+        <p:cNvPr id="1" name=""/>
+        <p:cNvGrpSpPr/>
+        <p:nvPr/>
+      </p:nvGrpSpPr>
+      <p:grpSpPr>
+        <a:xfrm>
+          <a:off x="0" y="0"/>
+          <a:ext cx="0" cy="0"/>
+          <a:chOff x="0" y="0"/>
+          <a:chExt cx="0" cy="0"/>
+        </a:xfrm>
+      </p:grpSpPr>
+      <p:sp>
+        <p:nvSpPr>
+          <p:cNvPr id="2" name="Title 1">
+            <a:extLst>
+              <a:ext uri="{FF2B5EF4-FFF2-40B4-BE49-F238E27FC236}">
+                <a16:creationId xmlns:a16="http://schemas.microsoft.com/office/drawing/2014/main" id="{2B9C0186-65D5-694C-BF34-3C58B06DDF06}"/>
+              </a:ext>
+            </a:extLst>
+          </p:cNvPr>
+          <p:cNvSpPr>
+            <a:spLocks noGrp="1"/>
+          </p:cNvSpPr>
+          <p:nvPr>
+            <p:ph type="title"/>
+          </p:nvPr>
+        </p:nvSpPr>
+        <p:spPr/>
+        <p:txBody>
+          <a:bodyPr/>
+          <a:lstStyle/>
+          <a:p>
+            <a:r>
+              <a:rPr lang="en-US" dirty="0"/>
+              <a:t>Strong cohesion (example)</a:t>
+            </a:r>
+          </a:p>
+        </p:txBody>
+      </p:sp>
+      <p:sp>
+        <p:nvSpPr>
+          <p:cNvPr id="3" name="Content Placeholder 2">
+            <a:extLst>
+              <a:ext uri="{FF2B5EF4-FFF2-40B4-BE49-F238E27FC236}">
+                <a16:creationId xmlns:a16="http://schemas.microsoft.com/office/drawing/2014/main" id="{A790AC2C-E718-1E46-A04B-3820A3976E8E}"/>
+              </a:ext>
+            </a:extLst>
+          </p:cNvPr>
+          <p:cNvSpPr>
+            <a:spLocks noGrp="1"/>
+          </p:cNvSpPr>
+          <p:nvPr>
+            <p:ph idx="1"/>
+          </p:nvPr>
+        </p:nvSpPr>
+        <p:spPr>
+          <a:xfrm>
+            <a:off x="1141412" y="3803514"/>
+            <a:ext cx="9905999" cy="2318427"/>
+          </a:xfrm>
+        </p:spPr>
+        <p:txBody>
+          <a:bodyPr>
+            <a:normAutofit fontScale="77500" lnSpcReduction="20000"/>
+          </a:bodyPr>
+          <a:lstStyle/>
+          <a:p>
+            <a:r>
+              <a:rPr lang="en-US" dirty="0"/>
+              <a:t>What if the Register class needs to do lots of other things besides creating payments?</a:t>
+            </a:r>
+          </a:p>
+          <a:p>
+            <a:r>
+              <a:rPr lang="en-US" dirty="0"/>
+              <a:t>Remember that the prime responsibilities of Register are the interaction with the customer</a:t>
+            </a:r>
+          </a:p>
+          <a:p>
+            <a:r>
+              <a:rPr lang="en-US" dirty="0"/>
+              <a:t>So do not bother it with details concerning payments</a:t>
+            </a:r>
+          </a:p>
+          <a:p>
+            <a:endParaRPr lang="en-US" dirty="0"/>
+          </a:p>
+        </p:txBody>
+      </p:sp>
+      <p:pic>
+        <p:nvPicPr>
+          <p:cNvPr id="5" name="Picture 4">
+            <a:extLst>
+              <a:ext uri="{FF2B5EF4-FFF2-40B4-BE49-F238E27FC236}">
+                <a16:creationId xmlns:a16="http://schemas.microsoft.com/office/drawing/2014/main" id="{D9D07439-BE0F-8848-B30B-AC1C0F62CE75}"/>
+              </a:ext>
+            </a:extLst>
+          </p:cNvPr>
+          <p:cNvPicPr>
+            <a:picLocks noChangeAspect="1"/>
+          </p:cNvPicPr>
+          <p:nvPr/>
+        </p:nvPicPr>
+        <p:blipFill>
+          <a:blip r:embed="rId2"/>
+          <a:stretch>
+            <a:fillRect/>
+          </a:stretch>
+        </p:blipFill>
+        <p:spPr>
+          <a:xfrm>
+            <a:off x="2287350" y="1746384"/>
+            <a:ext cx="7265211" cy="1924299"/>
+          </a:xfrm>
+          <a:prstGeom prst="rect">
+            <a:avLst/>
+          </a:prstGeom>
+          <a:solidFill>
+            <a:schemeClr val="accent2"/>
+          </a:solidFill>
+        </p:spPr>
+      </p:pic>
+    </p:spTree>
+    <p:extLst>
+      <p:ext uri="{BB962C8B-B14F-4D97-AF65-F5344CB8AC3E}">
+        <p14:creationId xmlns:p14="http://schemas.microsoft.com/office/powerpoint/2010/main" val="1537079925"/>
+      </p:ext>
+    </p:extLst>
+  </p:cSld>
+  <p:clrMapOvr>
+    <a:masterClrMapping/>
+  </p:clrMapOvr>
+</p:sld>
+</file>
+
+<file path=ppt/slides/slide62.xml><?xml version="1.0" encoding="utf-8"?>
+<p:sld xmlns:a="http://schemas.openxmlformats.org/drawingml/2006/main" xmlns:r="http://schemas.openxmlformats.org/officeDocument/2006/relationships" xmlns:p="http://schemas.openxmlformats.org/presentationml/2006/main">
+  <p:cSld>
+    <p:spTree>
+      <p:nvGrpSpPr>
+        <p:cNvPr id="1" name=""/>
+        <p:cNvGrpSpPr/>
+        <p:nvPr/>
+      </p:nvGrpSpPr>
+      <p:grpSpPr>
+        <a:xfrm>
+          <a:off x="0" y="0"/>
+          <a:ext cx="0" cy="0"/>
+          <a:chOff x="0" y="0"/>
+          <a:chExt cx="0" cy="0"/>
+        </a:xfrm>
+      </p:grpSpPr>
+      <p:sp>
+        <p:nvSpPr>
+          <p:cNvPr id="2" name="Title 1">
+            <a:extLst>
+              <a:ext uri="{FF2B5EF4-FFF2-40B4-BE49-F238E27FC236}">
+                <a16:creationId xmlns:a16="http://schemas.microsoft.com/office/drawing/2014/main" id="{ABF7E02D-4582-F047-B195-538A1E8E4037}"/>
+              </a:ext>
+            </a:extLst>
+          </p:cNvPr>
+          <p:cNvSpPr>
+            <a:spLocks noGrp="1"/>
+          </p:cNvSpPr>
+          <p:nvPr>
+            <p:ph type="title"/>
+          </p:nvPr>
+        </p:nvSpPr>
+        <p:spPr/>
+        <p:txBody>
+          <a:bodyPr/>
+          <a:lstStyle/>
+          <a:p>
+            <a:r>
+              <a:rPr lang="en-US" dirty="0"/>
+              <a:t>Strong cohesion (example)</a:t>
+            </a:r>
+          </a:p>
+        </p:txBody>
+      </p:sp>
+      <p:sp>
+        <p:nvSpPr>
+          <p:cNvPr id="3" name="Content Placeholder 2">
+            <a:extLst>
+              <a:ext uri="{FF2B5EF4-FFF2-40B4-BE49-F238E27FC236}">
+                <a16:creationId xmlns:a16="http://schemas.microsoft.com/office/drawing/2014/main" id="{D8E86E43-E61F-0748-9A61-CF27E07F0904}"/>
+              </a:ext>
+            </a:extLst>
+          </p:cNvPr>
+          <p:cNvSpPr>
+            <a:spLocks noGrp="1"/>
+          </p:cNvSpPr>
+          <p:nvPr>
+            <p:ph idx="1"/>
+          </p:nvPr>
+        </p:nvSpPr>
+        <p:spPr>
+          <a:xfrm>
+            <a:off x="1141412" y="4902740"/>
+            <a:ext cx="9905999" cy="1248383"/>
+          </a:xfrm>
+        </p:spPr>
+        <p:txBody>
+          <a:bodyPr>
+            <a:normAutofit fontScale="85000" lnSpcReduction="10000"/>
+          </a:bodyPr>
+          <a:lstStyle/>
+          <a:p>
+            <a:r>
+              <a:rPr lang="en-US" dirty="0"/>
+              <a:t>In this design, the Register does not know anything about payments</a:t>
+            </a:r>
+          </a:p>
+          <a:p>
+            <a:r>
+              <a:rPr lang="en-US" dirty="0"/>
+              <a:t>Great!</a:t>
+            </a:r>
+          </a:p>
+          <a:p>
+            <a:endParaRPr lang="en-US" dirty="0"/>
+          </a:p>
+        </p:txBody>
+      </p:sp>
+      <p:pic>
+        <p:nvPicPr>
+          <p:cNvPr id="5" name="Picture 4">
+            <a:extLst>
+              <a:ext uri="{FF2B5EF4-FFF2-40B4-BE49-F238E27FC236}">
+                <a16:creationId xmlns:a16="http://schemas.microsoft.com/office/drawing/2014/main" id="{989B2AD8-1556-3D4C-A4B8-7DFFFA4124F4}"/>
+              </a:ext>
+            </a:extLst>
+          </p:cNvPr>
+          <p:cNvPicPr>
+            <a:picLocks noChangeAspect="1"/>
+          </p:cNvPicPr>
+          <p:nvPr/>
+        </p:nvPicPr>
+        <p:blipFill>
+          <a:blip r:embed="rId2"/>
+          <a:stretch>
+            <a:fillRect/>
+          </a:stretch>
+        </p:blipFill>
+        <p:spPr>
+          <a:xfrm>
+            <a:off x="3107177" y="1825887"/>
+            <a:ext cx="5443436" cy="2862844"/>
+          </a:xfrm>
+          <a:prstGeom prst="rect">
+            <a:avLst/>
+          </a:prstGeom>
+          <a:solidFill>
+            <a:schemeClr val="accent2"/>
+          </a:solidFill>
+        </p:spPr>
+      </p:pic>
+    </p:spTree>
+    <p:extLst>
+      <p:ext uri="{BB962C8B-B14F-4D97-AF65-F5344CB8AC3E}">
+        <p14:creationId xmlns:p14="http://schemas.microsoft.com/office/powerpoint/2010/main" val="2789393677"/>
+      </p:ext>
+    </p:extLst>
+  </p:cSld>
+  <p:clrMapOvr>
+    <a:masterClrMapping/>
+  </p:clrMapOvr>
+</p:sld>
+</file>
+
+<file path=ppt/slides/slide63.xml><?xml version="1.0" encoding="utf-8"?>
+<p:sld xmlns:a="http://schemas.openxmlformats.org/drawingml/2006/main" xmlns:r="http://schemas.openxmlformats.org/officeDocument/2006/relationships" xmlns:p="http://schemas.openxmlformats.org/presentationml/2006/main">
+  <p:cSld>
+    <p:spTree>
+      <p:nvGrpSpPr>
+        <p:cNvPr id="1" name=""/>
+        <p:cNvGrpSpPr/>
+        <p:nvPr/>
+      </p:nvGrpSpPr>
+      <p:grpSpPr>
+        <a:xfrm>
+          <a:off x="0" y="0"/>
+          <a:ext cx="0" cy="0"/>
+          <a:chOff x="0" y="0"/>
+          <a:chExt cx="0" cy="0"/>
+        </a:xfrm>
+      </p:grpSpPr>
+      <p:sp>
+        <p:nvSpPr>
+          <p:cNvPr id="2" name="Title 1">
+            <a:extLst>
+              <a:ext uri="{FF2B5EF4-FFF2-40B4-BE49-F238E27FC236}">
+                <a16:creationId xmlns:a16="http://schemas.microsoft.com/office/drawing/2014/main" id="{F25CE371-7A90-6047-A1A0-119B8112D14F}"/>
+              </a:ext>
+            </a:extLst>
+          </p:cNvPr>
+          <p:cNvSpPr>
+            <a:spLocks noGrp="1"/>
+          </p:cNvSpPr>
+          <p:nvPr>
+            <p:ph type="title"/>
+          </p:nvPr>
+        </p:nvSpPr>
+        <p:spPr/>
+        <p:txBody>
+          <a:bodyPr/>
+          <a:lstStyle/>
+          <a:p>
+            <a:r>
+              <a:rPr lang="en-US" dirty="0"/>
+              <a:t>Strong cohesion</a:t>
+            </a:r>
+          </a:p>
+        </p:txBody>
+      </p:sp>
+      <p:sp>
+        <p:nvSpPr>
+          <p:cNvPr id="3" name="Content Placeholder 2">
+            <a:extLst>
+              <a:ext uri="{FF2B5EF4-FFF2-40B4-BE49-F238E27FC236}">
+                <a16:creationId xmlns:a16="http://schemas.microsoft.com/office/drawing/2014/main" id="{52FEABCC-4A91-1441-B197-632AB215F9AE}"/>
+              </a:ext>
+            </a:extLst>
+          </p:cNvPr>
+          <p:cNvSpPr>
+            <a:spLocks noGrp="1"/>
+          </p:cNvSpPr>
+          <p:nvPr>
+            <p:ph idx="1"/>
+          </p:nvPr>
+        </p:nvSpPr>
+        <p:spPr/>
+        <p:txBody>
+          <a:bodyPr/>
+          <a:lstStyle/>
+          <a:p>
+            <a:r>
+              <a:rPr lang="en-US" dirty="0"/>
+              <a:t>Like the Loose coupling principle, assigning responsibilities to strengthen cohesion is a rule of thumb…</a:t>
+            </a:r>
+          </a:p>
+          <a:p>
+            <a:r>
+              <a:rPr lang="en-US" dirty="0"/>
+              <a:t>…but break it with caution</a:t>
+            </a:r>
+          </a:p>
+          <a:p>
+            <a:endParaRPr lang="en-US" dirty="0"/>
+          </a:p>
+        </p:txBody>
+      </p:sp>
+    </p:spTree>
+    <p:extLst>
+      <p:ext uri="{BB962C8B-B14F-4D97-AF65-F5344CB8AC3E}">
+        <p14:creationId xmlns:p14="http://schemas.microsoft.com/office/powerpoint/2010/main" val="2518649743"/>
+      </p:ext>
+    </p:extLst>
+  </p:cSld>
+  <p:clrMapOvr>
+    <a:masterClrMapping/>
+  </p:clrMapOvr>
+</p:sld>
+</file>
+
+<file path=ppt/slides/slide64.xml><?xml version="1.0" encoding="utf-8"?>
+<p:sld xmlns:a="http://schemas.openxmlformats.org/drawingml/2006/main" xmlns:r="http://schemas.openxmlformats.org/officeDocument/2006/relationships" xmlns:p="http://schemas.openxmlformats.org/presentationml/2006/main">
+  <p:cSld>
+    <p:spTree>
+      <p:nvGrpSpPr>
+        <p:cNvPr id="1" name=""/>
+        <p:cNvGrpSpPr/>
+        <p:nvPr/>
+      </p:nvGrpSpPr>
+      <p:grpSpPr>
+        <a:xfrm>
+          <a:off x="0" y="0"/>
+          <a:ext cx="0" cy="0"/>
+          <a:chOff x="0" y="0"/>
+          <a:chExt cx="0" cy="0"/>
+        </a:xfrm>
+      </p:grpSpPr>
+      <p:sp>
+        <p:nvSpPr>
+          <p:cNvPr id="2" name="Title 1">
+            <a:extLst>
+              <a:ext uri="{FF2B5EF4-FFF2-40B4-BE49-F238E27FC236}">
+                <a16:creationId xmlns:a16="http://schemas.microsoft.com/office/drawing/2014/main" id="{9B207458-7C7B-524F-92BB-3690E555CD37}"/>
+              </a:ext>
+            </a:extLst>
+          </p:cNvPr>
+          <p:cNvSpPr>
+            <a:spLocks noGrp="1"/>
+          </p:cNvSpPr>
+          <p:nvPr>
+            <p:ph type="title"/>
+          </p:nvPr>
+        </p:nvSpPr>
+        <p:spPr/>
+        <p:txBody>
+          <a:bodyPr/>
+          <a:lstStyle/>
+          <a:p>
+            <a:r>
+              <a:rPr lang="en-US" dirty="0"/>
+              <a:t>Controller</a:t>
+            </a:r>
+          </a:p>
+        </p:txBody>
+      </p:sp>
+      <p:sp>
+        <p:nvSpPr>
+          <p:cNvPr id="3" name="Content Placeholder 2">
+            <a:extLst>
+              <a:ext uri="{FF2B5EF4-FFF2-40B4-BE49-F238E27FC236}">
+                <a16:creationId xmlns:a16="http://schemas.microsoft.com/office/drawing/2014/main" id="{8CE15130-74A7-7A44-B8D4-DD437F497E22}"/>
+              </a:ext>
+            </a:extLst>
+          </p:cNvPr>
+          <p:cNvSpPr>
+            <a:spLocks noGrp="1"/>
+          </p:cNvSpPr>
+          <p:nvPr>
+            <p:ph idx="1"/>
+          </p:nvPr>
+        </p:nvSpPr>
+        <p:spPr/>
+        <p:txBody>
+          <a:bodyPr>
+            <a:normAutofit fontScale="77500" lnSpcReduction="20000"/>
+          </a:bodyPr>
+          <a:lstStyle/>
+          <a:p>
+            <a:pPr marL="0" indent="0">
+              <a:buNone/>
+            </a:pPr>
+            <a:r>
+              <a:rPr lang="en-US" b="1" dirty="0"/>
+              <a:t>Idea: </a:t>
+            </a:r>
+            <a:r>
+              <a:rPr lang="en-US" dirty="0"/>
+              <a:t>Assign the responsibility for receiving or handling system events to a class</a:t>
+            </a:r>
+          </a:p>
+          <a:p>
+            <a:r>
+              <a:rPr lang="en-US" dirty="0"/>
+              <a:t>that represents the overall system, device, or subsystem</a:t>
+            </a:r>
+          </a:p>
+          <a:p>
+            <a:r>
+              <a:rPr lang="en-US" dirty="0"/>
+              <a:t>that represents a specific use case within which the system event occurs. Such a class is often called the Handler or Controller.</a:t>
+            </a:r>
+          </a:p>
+          <a:p>
+            <a:pPr marL="0" indent="0">
+              <a:buNone/>
+            </a:pPr>
+            <a:r>
+              <a:rPr lang="en-US" dirty="0"/>
+              <a:t>Motivation: Many use cases or scenarios mention that “The system does X” - but what class should represent “the system”? The Controller principle suggests designing separate classes to handle individual use cases.</a:t>
+            </a:r>
+          </a:p>
+        </p:txBody>
+      </p:sp>
+    </p:spTree>
+    <p:extLst>
+      <p:ext uri="{BB962C8B-B14F-4D97-AF65-F5344CB8AC3E}">
+        <p14:creationId xmlns:p14="http://schemas.microsoft.com/office/powerpoint/2010/main" val="3629642088"/>
+      </p:ext>
+    </p:extLst>
+  </p:cSld>
+  <p:clrMapOvr>
+    <a:masterClrMapping/>
+  </p:clrMapOvr>
+</p:sld>
+</file>
+
+<file path=ppt/slides/slide65.xml><?xml version="1.0" encoding="utf-8"?>
+<p:sld xmlns:a="http://schemas.openxmlformats.org/drawingml/2006/main" xmlns:r="http://schemas.openxmlformats.org/officeDocument/2006/relationships" xmlns:p="http://schemas.openxmlformats.org/presentationml/2006/main">
+  <p:cSld>
+    <p:spTree>
+      <p:nvGrpSpPr>
+        <p:cNvPr id="1" name=""/>
+        <p:cNvGrpSpPr/>
+        <p:nvPr/>
+      </p:nvGrpSpPr>
+      <p:grpSpPr>
+        <a:xfrm>
+          <a:off x="0" y="0"/>
+          <a:ext cx="0" cy="0"/>
+          <a:chOff x="0" y="0"/>
+          <a:chExt cx="0" cy="0"/>
+        </a:xfrm>
+      </p:grpSpPr>
+      <p:sp>
+        <p:nvSpPr>
+          <p:cNvPr id="2" name="Title 1">
+            <a:extLst>
+              <a:ext uri="{FF2B5EF4-FFF2-40B4-BE49-F238E27FC236}">
+                <a16:creationId xmlns:a16="http://schemas.microsoft.com/office/drawing/2014/main" id="{4FBD7029-C8AA-484E-B000-D6A67B4AAB02}"/>
+              </a:ext>
+            </a:extLst>
+          </p:cNvPr>
+          <p:cNvSpPr>
+            <a:spLocks noGrp="1"/>
+          </p:cNvSpPr>
+          <p:nvPr>
+            <p:ph type="title"/>
+          </p:nvPr>
+        </p:nvSpPr>
+        <p:spPr/>
+        <p:txBody>
+          <a:bodyPr/>
+          <a:lstStyle/>
+          <a:p>
+            <a:r>
+              <a:rPr lang="en-US" dirty="0"/>
+              <a:t>Applying GRASP principles</a:t>
+            </a:r>
+          </a:p>
+        </p:txBody>
+      </p:sp>
+      <p:sp>
+        <p:nvSpPr>
+          <p:cNvPr id="3" name="Content Placeholder 2">
+            <a:extLst>
+              <a:ext uri="{FF2B5EF4-FFF2-40B4-BE49-F238E27FC236}">
+                <a16:creationId xmlns:a16="http://schemas.microsoft.com/office/drawing/2014/main" id="{3584DF97-C2CE-7349-841A-3CAE74CB0F7E}"/>
+              </a:ext>
+            </a:extLst>
+          </p:cNvPr>
+          <p:cNvSpPr>
+            <a:spLocks noGrp="1"/>
+          </p:cNvSpPr>
+          <p:nvPr>
+            <p:ph idx="1"/>
+          </p:nvPr>
+        </p:nvSpPr>
+        <p:spPr/>
+        <p:txBody>
+          <a:bodyPr>
+            <a:normAutofit fontScale="85000" lnSpcReduction="10000"/>
+          </a:bodyPr>
+          <a:lstStyle/>
+          <a:p>
+            <a:r>
+              <a:rPr lang="en-US" dirty="0"/>
+              <a:t>You can use the data you have gathered (domain model, use cases, requirements documents, interaction diagrams, etc.) to </a:t>
+            </a:r>
+            <a:r>
+              <a:rPr lang="en-US" i="1" dirty="0"/>
+              <a:t>design</a:t>
+            </a:r>
+            <a:r>
+              <a:rPr lang="en-US" dirty="0"/>
+              <a:t> the software system.</a:t>
+            </a:r>
+          </a:p>
+          <a:p>
+            <a:r>
+              <a:rPr lang="en-US" dirty="0"/>
+              <a:t>One way to do this is through </a:t>
+            </a:r>
+            <a:r>
+              <a:rPr lang="en-US" i="1" dirty="0"/>
+              <a:t>use case realizations </a:t>
+            </a:r>
+            <a:r>
+              <a:rPr lang="en-US" dirty="0"/>
+              <a:t>– which involves defining the classes in the software system and how they collaborate to execute a particular use case.</a:t>
+            </a:r>
+          </a:p>
+          <a:p>
+            <a:r>
+              <a:rPr lang="en-US" dirty="0"/>
+              <a:t>Here the GRASP principles can justify your design choices.</a:t>
+            </a:r>
+          </a:p>
+          <a:p>
+            <a:endParaRPr lang="en-US" dirty="0"/>
+          </a:p>
+        </p:txBody>
+      </p:sp>
+    </p:spTree>
+    <p:extLst>
+      <p:ext uri="{BB962C8B-B14F-4D97-AF65-F5344CB8AC3E}">
+        <p14:creationId xmlns:p14="http://schemas.microsoft.com/office/powerpoint/2010/main" val="4176154913"/>
+      </p:ext>
+    </p:extLst>
+  </p:cSld>
+  <p:clrMapOvr>
+    <a:masterClrMapping/>
+  </p:clrMapOvr>
+</p:sld>
+</file>
+
+<file path=ppt/slides/slide66.xml><?xml version="1.0" encoding="utf-8"?>
+<p:sld xmlns:a="http://schemas.openxmlformats.org/drawingml/2006/main" xmlns:r="http://schemas.openxmlformats.org/officeDocument/2006/relationships" xmlns:p="http://schemas.openxmlformats.org/presentationml/2006/main">
+  <p:cSld>
+    <p:spTree>
+      <p:nvGrpSpPr>
+        <p:cNvPr id="1" name=""/>
+        <p:cNvGrpSpPr/>
+        <p:nvPr/>
+      </p:nvGrpSpPr>
+      <p:grpSpPr>
+        <a:xfrm>
+          <a:off x="0" y="0"/>
+          <a:ext cx="0" cy="0"/>
+          <a:chOff x="0" y="0"/>
+          <a:chExt cx="0" cy="0"/>
+        </a:xfrm>
+      </p:grpSpPr>
+      <p:sp>
+        <p:nvSpPr>
+          <p:cNvPr id="2" name="Title 1">
+            <a:extLst>
+              <a:ext uri="{FF2B5EF4-FFF2-40B4-BE49-F238E27FC236}">
+                <a16:creationId xmlns:a16="http://schemas.microsoft.com/office/drawing/2014/main" id="{7B3C992A-7D92-DF41-B2DB-4BE379DA3719}"/>
+              </a:ext>
+            </a:extLst>
+          </p:cNvPr>
+          <p:cNvSpPr>
+            <a:spLocks noGrp="1"/>
+          </p:cNvSpPr>
+          <p:nvPr>
+            <p:ph type="title"/>
+          </p:nvPr>
+        </p:nvSpPr>
+        <p:spPr/>
+        <p:txBody>
+          <a:bodyPr/>
+          <a:lstStyle/>
+          <a:p>
+            <a:r>
+              <a:rPr lang="en-US" dirty="0"/>
+              <a:t>Case study: </a:t>
+            </a:r>
+            <a:r>
+              <a:rPr lang="en-US" dirty="0" err="1"/>
+              <a:t>NextGen</a:t>
+            </a:r>
+            <a:r>
+              <a:rPr lang="en-US" dirty="0"/>
+              <a:t> POS system</a:t>
+            </a:r>
+          </a:p>
+        </p:txBody>
+      </p:sp>
+      <p:sp>
+        <p:nvSpPr>
+          <p:cNvPr id="3" name="Content Placeholder 2">
+            <a:extLst>
+              <a:ext uri="{FF2B5EF4-FFF2-40B4-BE49-F238E27FC236}">
+                <a16:creationId xmlns:a16="http://schemas.microsoft.com/office/drawing/2014/main" id="{3864FCFC-E960-7F4D-B2C3-451F92AEF934}"/>
+              </a:ext>
+            </a:extLst>
+          </p:cNvPr>
+          <p:cNvSpPr>
+            <a:spLocks noGrp="1"/>
+          </p:cNvSpPr>
+          <p:nvPr>
+            <p:ph idx="1"/>
+          </p:nvPr>
+        </p:nvSpPr>
+        <p:spPr>
+          <a:xfrm>
+            <a:off x="1141412" y="1926078"/>
+            <a:ext cx="9905999" cy="4299624"/>
+          </a:xfrm>
+        </p:spPr>
+        <p:txBody>
+          <a:bodyPr>
+            <a:normAutofit fontScale="70000" lnSpcReduction="20000"/>
+          </a:bodyPr>
+          <a:lstStyle/>
+          <a:p>
+            <a:pPr marL="0" indent="0">
+              <a:buNone/>
+            </a:pPr>
+            <a:r>
+              <a:rPr lang="en-US" dirty="0"/>
+              <a:t>Consider the following use case (fragment):</a:t>
+            </a:r>
+          </a:p>
+          <a:p>
+            <a:pPr marL="514350" indent="-514350">
+              <a:buFont typeface="+mj-lt"/>
+              <a:buAutoNum type="arabicPeriod"/>
+            </a:pPr>
+            <a:r>
+              <a:rPr lang="en-US" dirty="0"/>
+              <a:t>Customer arrives</a:t>
+            </a:r>
+          </a:p>
+          <a:p>
+            <a:pPr marL="514350" indent="-514350">
+              <a:buFont typeface="+mj-lt"/>
+              <a:buAutoNum type="arabicPeriod"/>
+            </a:pPr>
+            <a:r>
+              <a:rPr lang="en-US" dirty="0"/>
+              <a:t>Cashier tells the system to create a new Sale</a:t>
+            </a:r>
+          </a:p>
+          <a:p>
+            <a:pPr marL="514350" indent="-514350">
+              <a:buFont typeface="+mj-lt"/>
+              <a:buAutoNum type="arabicPeriod"/>
+            </a:pPr>
+            <a:r>
+              <a:rPr lang="en-US" dirty="0"/>
+              <a:t>Cashier enters item identifier and quantity</a:t>
+            </a:r>
+          </a:p>
+          <a:p>
+            <a:pPr marL="514350" indent="-514350">
+              <a:buFont typeface="+mj-lt"/>
+              <a:buAutoNum type="arabicPeriod"/>
+            </a:pPr>
+            <a:r>
+              <a:rPr lang="en-US" dirty="0"/>
+              <a:t>System records item identifier and quantity</a:t>
+            </a:r>
+          </a:p>
+          <a:p>
+            <a:pPr marL="514350" indent="-514350">
+              <a:buFont typeface="+mj-lt"/>
+              <a:buAutoNum type="arabicPeriod"/>
+            </a:pPr>
+            <a:r>
+              <a:rPr lang="en-US" dirty="0"/>
+              <a:t>Cashier repeats steps 3 and 4 until all items have been processed</a:t>
+            </a:r>
+          </a:p>
+          <a:p>
+            <a:pPr marL="514350" indent="-514350">
+              <a:buFont typeface="+mj-lt"/>
+              <a:buAutoNum type="arabicPeriod"/>
+            </a:pPr>
+            <a:r>
+              <a:rPr lang="en-US" dirty="0"/>
+              <a:t>System presents total with all taxes calculated</a:t>
+            </a:r>
+          </a:p>
+          <a:p>
+            <a:pPr marL="0" indent="0">
+              <a:buNone/>
+            </a:pPr>
+            <a:r>
+              <a:rPr lang="en-US" b="1" dirty="0"/>
+              <a:t>Question: </a:t>
+            </a:r>
+            <a:r>
+              <a:rPr lang="en-US" dirty="0"/>
+              <a:t>Who is responsible for creating the new Sale object? What other data should be initialized once the Sale is created?</a:t>
+            </a:r>
+          </a:p>
+        </p:txBody>
+      </p:sp>
+    </p:spTree>
+    <p:extLst>
+      <p:ext uri="{BB962C8B-B14F-4D97-AF65-F5344CB8AC3E}">
+        <p14:creationId xmlns:p14="http://schemas.microsoft.com/office/powerpoint/2010/main" val="309411858"/>
+      </p:ext>
+    </p:extLst>
+  </p:cSld>
+  <p:clrMapOvr>
+    <a:masterClrMapping/>
+  </p:clrMapOvr>
+</p:sld>
+</file>
+
+<file path=ppt/slides/slide67.xml><?xml version="1.0" encoding="utf-8"?>
+<p:sld xmlns:a="http://schemas.openxmlformats.org/drawingml/2006/main" xmlns:r="http://schemas.openxmlformats.org/officeDocument/2006/relationships" xmlns:p="http://schemas.openxmlformats.org/presentationml/2006/main">
+  <p:cSld>
+    <p:spTree>
+      <p:nvGrpSpPr>
+        <p:cNvPr id="1" name=""/>
+        <p:cNvGrpSpPr/>
+        <p:nvPr/>
+      </p:nvGrpSpPr>
+      <p:grpSpPr>
+        <a:xfrm>
+          <a:off x="0" y="0"/>
+          <a:ext cx="0" cy="0"/>
+          <a:chOff x="0" y="0"/>
+          <a:chExt cx="0" cy="0"/>
+        </a:xfrm>
+      </p:grpSpPr>
+      <p:sp>
+        <p:nvSpPr>
+          <p:cNvPr id="2" name="Title 1">
+            <a:extLst>
+              <a:ext uri="{FF2B5EF4-FFF2-40B4-BE49-F238E27FC236}">
+                <a16:creationId xmlns:a16="http://schemas.microsoft.com/office/drawing/2014/main" id="{FA58B475-E588-CF44-A342-6BEF3A61A6A9}"/>
+              </a:ext>
+            </a:extLst>
+          </p:cNvPr>
+          <p:cNvSpPr>
+            <a:spLocks noGrp="1"/>
+          </p:cNvSpPr>
+          <p:nvPr>
+            <p:ph type="title"/>
+          </p:nvPr>
+        </p:nvSpPr>
+        <p:spPr/>
+        <p:txBody>
+          <a:bodyPr/>
+          <a:lstStyle/>
+          <a:p>
+            <a:r>
+              <a:rPr lang="en-US" dirty="0"/>
+              <a:t>Case study: make new sale</a:t>
+            </a:r>
+          </a:p>
+        </p:txBody>
+      </p:sp>
+      <p:sp>
+        <p:nvSpPr>
+          <p:cNvPr id="3" name="Content Placeholder 2">
+            <a:extLst>
+              <a:ext uri="{FF2B5EF4-FFF2-40B4-BE49-F238E27FC236}">
+                <a16:creationId xmlns:a16="http://schemas.microsoft.com/office/drawing/2014/main" id="{87120A89-FEAA-1348-82B1-FAFA647BADD0}"/>
+              </a:ext>
+            </a:extLst>
+          </p:cNvPr>
+          <p:cNvSpPr>
+            <a:spLocks noGrp="1"/>
+          </p:cNvSpPr>
+          <p:nvPr>
+            <p:ph idx="1"/>
+          </p:nvPr>
+        </p:nvSpPr>
+        <p:spPr>
+          <a:xfrm>
+            <a:off x="1141413" y="1857984"/>
+            <a:ext cx="9905999" cy="4601182"/>
+          </a:xfrm>
+        </p:spPr>
+        <p:txBody>
+          <a:bodyPr>
+            <a:normAutofit fontScale="77500" lnSpcReduction="20000"/>
+          </a:bodyPr>
+          <a:lstStyle/>
+          <a:p>
+            <a:r>
+              <a:rPr lang="en-US" dirty="0"/>
+              <a:t>Once the Customer arrives, the Cashier should initiate a new Sale in the system.</a:t>
+            </a:r>
+          </a:p>
+          <a:p>
+            <a:r>
+              <a:rPr lang="en-US" dirty="0"/>
+              <a:t>Applying the Controller principle, we should define a Register class that handles such requests (or if we have lots of different functionality, a specific </a:t>
+            </a:r>
+            <a:r>
+              <a:rPr lang="en-US" dirty="0" err="1"/>
+              <a:t>SaleHandler</a:t>
+            </a:r>
+            <a:r>
+              <a:rPr lang="en-US" dirty="0"/>
+              <a:t> class).</a:t>
+            </a:r>
+          </a:p>
+          <a:p>
+            <a:r>
+              <a:rPr lang="en-US" dirty="0"/>
+              <a:t>This Register class should provide a </a:t>
+            </a:r>
+            <a:r>
+              <a:rPr lang="en-US" dirty="0" err="1"/>
+              <a:t>makeNewSale</a:t>
+            </a:r>
+            <a:r>
+              <a:rPr lang="en-US" dirty="0"/>
+              <a:t>() method.</a:t>
+            </a:r>
+          </a:p>
+          <a:p>
+            <a:r>
+              <a:rPr lang="en-US" dirty="0"/>
+              <a:t>From our domain model, we have learned that a Sale also has a list of </a:t>
+            </a:r>
+            <a:r>
+              <a:rPr lang="en-US" dirty="0" err="1"/>
+              <a:t>SalesLineItems</a:t>
+            </a:r>
+            <a:r>
+              <a:rPr lang="en-US" dirty="0"/>
+              <a:t>. This list should also be initialized.</a:t>
+            </a:r>
+          </a:p>
+          <a:p>
+            <a:r>
+              <a:rPr lang="en-US" dirty="0"/>
+              <a:t>The Creator pattern suggests that this should be the responsibility of the Sale.</a:t>
+            </a:r>
+          </a:p>
+        </p:txBody>
+      </p:sp>
+    </p:spTree>
+    <p:extLst>
+      <p:ext uri="{BB962C8B-B14F-4D97-AF65-F5344CB8AC3E}">
+        <p14:creationId xmlns:p14="http://schemas.microsoft.com/office/powerpoint/2010/main" val="3493661069"/>
+      </p:ext>
+    </p:extLst>
+  </p:cSld>
+  <p:clrMapOvr>
+    <a:masterClrMapping/>
+  </p:clrMapOvr>
+</p:sld>
+</file>
+
+<file path=ppt/slides/slide68.xml><?xml version="1.0" encoding="utf-8"?>
+<p:sld xmlns:a="http://schemas.openxmlformats.org/drawingml/2006/main" xmlns:r="http://schemas.openxmlformats.org/officeDocument/2006/relationships" xmlns:p="http://schemas.openxmlformats.org/presentationml/2006/main">
+  <p:cSld>
+    <p:spTree>
+      <p:nvGrpSpPr>
+        <p:cNvPr id="1" name=""/>
+        <p:cNvGrpSpPr/>
+        <p:nvPr/>
+      </p:nvGrpSpPr>
+      <p:grpSpPr>
+        <a:xfrm>
+          <a:off x="0" y="0"/>
+          <a:ext cx="0" cy="0"/>
+          <a:chOff x="0" y="0"/>
+          <a:chExt cx="0" cy="0"/>
+        </a:xfrm>
+      </p:grpSpPr>
+      <p:sp>
+        <p:nvSpPr>
+          <p:cNvPr id="2" name="Title 1">
+            <a:extLst>
+              <a:ext uri="{FF2B5EF4-FFF2-40B4-BE49-F238E27FC236}">
+                <a16:creationId xmlns:a16="http://schemas.microsoft.com/office/drawing/2014/main" id="{7B3C992A-7D92-DF41-B2DB-4BE379DA3719}"/>
+              </a:ext>
+            </a:extLst>
+          </p:cNvPr>
+          <p:cNvSpPr>
+            <a:spLocks noGrp="1"/>
+          </p:cNvSpPr>
+          <p:nvPr>
+            <p:ph type="title"/>
+          </p:nvPr>
+        </p:nvSpPr>
+        <p:spPr/>
+        <p:txBody>
+          <a:bodyPr/>
+          <a:lstStyle/>
+          <a:p>
+            <a:r>
+              <a:rPr lang="en-US" dirty="0"/>
+              <a:t>Case study: </a:t>
+            </a:r>
+            <a:r>
+              <a:rPr lang="en-US" dirty="0" err="1"/>
+              <a:t>NextGen</a:t>
+            </a:r>
+            <a:r>
+              <a:rPr lang="en-US" dirty="0"/>
+              <a:t> POS system</a:t>
+            </a:r>
+          </a:p>
+        </p:txBody>
+      </p:sp>
+      <p:sp>
+        <p:nvSpPr>
+          <p:cNvPr id="3" name="Content Placeholder 2">
+            <a:extLst>
+              <a:ext uri="{FF2B5EF4-FFF2-40B4-BE49-F238E27FC236}">
+                <a16:creationId xmlns:a16="http://schemas.microsoft.com/office/drawing/2014/main" id="{3864FCFC-E960-7F4D-B2C3-451F92AEF934}"/>
+              </a:ext>
+            </a:extLst>
+          </p:cNvPr>
+          <p:cNvSpPr>
+            <a:spLocks noGrp="1"/>
+          </p:cNvSpPr>
+          <p:nvPr>
+            <p:ph idx="1"/>
+          </p:nvPr>
+        </p:nvSpPr>
+        <p:spPr>
+          <a:xfrm>
+            <a:off x="1141412" y="1926078"/>
+            <a:ext cx="9905999" cy="4299624"/>
+          </a:xfrm>
+        </p:spPr>
+        <p:txBody>
+          <a:bodyPr>
+            <a:normAutofit fontScale="77500" lnSpcReduction="20000"/>
+          </a:bodyPr>
+          <a:lstStyle/>
+          <a:p>
+            <a:pPr marL="0" indent="0">
+              <a:buNone/>
+            </a:pPr>
+            <a:r>
+              <a:rPr lang="en-US" dirty="0"/>
+              <a:t>Consider the following use case (fragment):</a:t>
+            </a:r>
+          </a:p>
+          <a:p>
+            <a:pPr marL="514350" indent="-514350">
+              <a:buFont typeface="+mj-lt"/>
+              <a:buAutoNum type="arabicPeriod"/>
+            </a:pPr>
+            <a:r>
+              <a:rPr lang="en-US" dirty="0"/>
+              <a:t>Customer arrives</a:t>
+            </a:r>
+          </a:p>
+          <a:p>
+            <a:pPr marL="514350" indent="-514350">
+              <a:buFont typeface="+mj-lt"/>
+              <a:buAutoNum type="arabicPeriod"/>
+            </a:pPr>
+            <a:r>
+              <a:rPr lang="en-US" dirty="0"/>
+              <a:t>Cashier tells the system to create a new Sale</a:t>
+            </a:r>
+          </a:p>
+          <a:p>
+            <a:pPr marL="514350" indent="-514350">
+              <a:buFont typeface="+mj-lt"/>
+              <a:buAutoNum type="arabicPeriod"/>
+            </a:pPr>
+            <a:r>
+              <a:rPr lang="en-US" dirty="0"/>
+              <a:t>Cashier enters item identifier and quantity</a:t>
+            </a:r>
+          </a:p>
+          <a:p>
+            <a:pPr marL="514350" indent="-514350">
+              <a:buFont typeface="+mj-lt"/>
+              <a:buAutoNum type="arabicPeriod"/>
+            </a:pPr>
+            <a:r>
+              <a:rPr lang="en-US" dirty="0"/>
+              <a:t>System records item identifier and quantity</a:t>
+            </a:r>
+          </a:p>
+          <a:p>
+            <a:pPr marL="514350" indent="-514350">
+              <a:buFont typeface="+mj-lt"/>
+              <a:buAutoNum type="arabicPeriod"/>
+            </a:pPr>
+            <a:r>
+              <a:rPr lang="en-US" dirty="0"/>
+              <a:t>Cashier repeats steps 3 and 4 until all items have been processed</a:t>
+            </a:r>
+          </a:p>
+          <a:p>
+            <a:pPr marL="514350" indent="-514350">
+              <a:buFont typeface="+mj-lt"/>
+              <a:buAutoNum type="arabicPeriod"/>
+            </a:pPr>
+            <a:r>
+              <a:rPr lang="en-US" dirty="0"/>
+              <a:t>System presents total with all taxes calculated</a:t>
+            </a:r>
+          </a:p>
+          <a:p>
+            <a:pPr marL="0" indent="0">
+              <a:buNone/>
+            </a:pPr>
+            <a:r>
+              <a:rPr lang="en-US" b="1" dirty="0"/>
+              <a:t>Question: </a:t>
+            </a:r>
+            <a:r>
+              <a:rPr lang="en-US" dirty="0"/>
+              <a:t>Who is responsible for computing the total price (including taxes)?</a:t>
+            </a:r>
+          </a:p>
+          <a:p>
+            <a:pPr marL="0" indent="0">
+              <a:buNone/>
+            </a:pPr>
+            <a:endParaRPr lang="en-US" dirty="0"/>
+          </a:p>
+        </p:txBody>
+      </p:sp>
+    </p:spTree>
+    <p:extLst>
+      <p:ext uri="{BB962C8B-B14F-4D97-AF65-F5344CB8AC3E}">
+        <p14:creationId xmlns:p14="http://schemas.microsoft.com/office/powerpoint/2010/main" val="1706345827"/>
+      </p:ext>
+    </p:extLst>
+  </p:cSld>
+  <p:clrMapOvr>
+    <a:masterClrMapping/>
+  </p:clrMapOvr>
+</p:sld>
+</file>
+
+<file path=ppt/slides/slide69.xml><?xml version="1.0" encoding="utf-8"?>
+<p:sld xmlns:a="http://schemas.openxmlformats.org/drawingml/2006/main" xmlns:r="http://schemas.openxmlformats.org/officeDocument/2006/relationships" xmlns:p="http://schemas.openxmlformats.org/presentationml/2006/main">
+  <p:cSld>
+    <p:spTree>
+      <p:nvGrpSpPr>
+        <p:cNvPr id="1" name=""/>
+        <p:cNvGrpSpPr/>
+        <p:nvPr/>
+      </p:nvGrpSpPr>
+      <p:grpSpPr>
+        <a:xfrm>
+          <a:off x="0" y="0"/>
+          <a:ext cx="0" cy="0"/>
+          <a:chOff x="0" y="0"/>
+          <a:chExt cx="0" cy="0"/>
+        </a:xfrm>
+      </p:grpSpPr>
+      <p:sp>
+        <p:nvSpPr>
+          <p:cNvPr id="2" name="Title 1">
+            <a:extLst>
+              <a:ext uri="{FF2B5EF4-FFF2-40B4-BE49-F238E27FC236}">
+                <a16:creationId xmlns:a16="http://schemas.microsoft.com/office/drawing/2014/main" id="{E8945600-AC17-7C4C-B1DC-D1ACEEB4DC3B}"/>
+              </a:ext>
+            </a:extLst>
+          </p:cNvPr>
+          <p:cNvSpPr>
+            <a:spLocks noGrp="1"/>
+          </p:cNvSpPr>
+          <p:nvPr>
+            <p:ph type="title"/>
+          </p:nvPr>
+        </p:nvSpPr>
+        <p:spPr/>
+        <p:txBody>
+          <a:bodyPr/>
+          <a:lstStyle/>
+          <a:p>
+            <a:r>
+              <a:rPr lang="en-US" dirty="0"/>
+              <a:t>Case study: compute total</a:t>
+            </a:r>
+          </a:p>
+        </p:txBody>
+      </p:sp>
+      <p:sp>
+        <p:nvSpPr>
+          <p:cNvPr id="3" name="Content Placeholder 2">
+            <a:extLst>
+              <a:ext uri="{FF2B5EF4-FFF2-40B4-BE49-F238E27FC236}">
+                <a16:creationId xmlns:a16="http://schemas.microsoft.com/office/drawing/2014/main" id="{0B52EC2D-2497-F841-A3C2-67D3D1348F0E}"/>
+              </a:ext>
+            </a:extLst>
+          </p:cNvPr>
+          <p:cNvSpPr>
+            <a:spLocks noGrp="1"/>
+          </p:cNvSpPr>
+          <p:nvPr>
+            <p:ph idx="1"/>
+          </p:nvPr>
+        </p:nvSpPr>
+        <p:spPr/>
+        <p:txBody>
+          <a:bodyPr>
+            <a:normAutofit/>
+          </a:bodyPr>
+          <a:lstStyle/>
+          <a:p>
+            <a:r>
+              <a:rPr lang="en-US" dirty="0"/>
+              <a:t>Calculating the price requires knowledge about all the items and quantities involved.</a:t>
+            </a:r>
+          </a:p>
+          <a:p>
+            <a:r>
+              <a:rPr lang="en-US" dirty="0"/>
+              <a:t>This is information that the Sale has.</a:t>
+            </a:r>
+          </a:p>
+          <a:p>
+            <a:r>
+              <a:rPr lang="en-US" dirty="0"/>
+              <a:t>We can now apply the </a:t>
+            </a:r>
+            <a:r>
+              <a:rPr lang="en-US" i="1" dirty="0"/>
+              <a:t>Information Expert principle.</a:t>
+            </a:r>
+          </a:p>
+          <a:p>
+            <a:r>
+              <a:rPr lang="en-US" dirty="0"/>
+              <a:t>So: the Sale class should support a </a:t>
+            </a:r>
+            <a:r>
+              <a:rPr lang="en-US" dirty="0" err="1"/>
+              <a:t>getTotal</a:t>
+            </a:r>
+            <a:r>
+              <a:rPr lang="en-US" dirty="0"/>
+              <a:t>() method.</a:t>
+            </a:r>
+          </a:p>
+          <a:p>
+            <a:endParaRPr lang="en-US" dirty="0"/>
+          </a:p>
+        </p:txBody>
+      </p:sp>
+    </p:spTree>
+    <p:extLst>
+      <p:ext uri="{BB962C8B-B14F-4D97-AF65-F5344CB8AC3E}">
+        <p14:creationId xmlns:p14="http://schemas.microsoft.com/office/powerpoint/2010/main" val="2263033224"/>
+      </p:ext>
+    </p:extLst>
+  </p:cSld>
+  <p:clrMapOvr>
+    <a:masterClrMapping/>
+  </p:clrMapOvr>
+</p:sld>
+</file>
+
 <file path=ppt/slides/slide7.xml><?xml version="1.0" encoding="utf-8"?>
 <p:sld xmlns:a="http://schemas.openxmlformats.org/drawingml/2006/main" xmlns:r="http://schemas.openxmlformats.org/officeDocument/2006/relationships" xmlns:p="http://schemas.openxmlformats.org/presentationml/2006/main">
   <p:cSld>
@@ -19904,6 +21288,739 @@
     <p:extLst>
       <p:ext uri="{BB962C8B-B14F-4D97-AF65-F5344CB8AC3E}">
         <p14:creationId xmlns:p14="http://schemas.microsoft.com/office/powerpoint/2010/main" val="4092709995"/>
+      </p:ext>
+    </p:extLst>
+  </p:cSld>
+  <p:clrMapOvr>
+    <a:masterClrMapping/>
+  </p:clrMapOvr>
+</p:sld>
+</file>
+
+<file path=ppt/slides/slide70.xml><?xml version="1.0" encoding="utf-8"?>
+<p:sld xmlns:a="http://schemas.openxmlformats.org/drawingml/2006/main" xmlns:r="http://schemas.openxmlformats.org/officeDocument/2006/relationships" xmlns:p="http://schemas.openxmlformats.org/presentationml/2006/main">
+  <p:cSld>
+    <p:spTree>
+      <p:nvGrpSpPr>
+        <p:cNvPr id="1" name=""/>
+        <p:cNvGrpSpPr/>
+        <p:nvPr/>
+      </p:nvGrpSpPr>
+      <p:grpSpPr>
+        <a:xfrm>
+          <a:off x="0" y="0"/>
+          <a:ext cx="0" cy="0"/>
+          <a:chOff x="0" y="0"/>
+          <a:chExt cx="0" cy="0"/>
+        </a:xfrm>
+      </p:grpSpPr>
+      <p:sp>
+        <p:nvSpPr>
+          <p:cNvPr id="2" name="Title 1">
+            <a:extLst>
+              <a:ext uri="{FF2B5EF4-FFF2-40B4-BE49-F238E27FC236}">
+                <a16:creationId xmlns:a16="http://schemas.microsoft.com/office/drawing/2014/main" id="{03250EF3-0346-1248-9CF7-4DE0D78949C0}"/>
+              </a:ext>
+            </a:extLst>
+          </p:cNvPr>
+          <p:cNvSpPr>
+            <a:spLocks noGrp="1"/>
+          </p:cNvSpPr>
+          <p:nvPr>
+            <p:ph type="title"/>
+          </p:nvPr>
+        </p:nvSpPr>
+        <p:spPr/>
+        <p:txBody>
+          <a:bodyPr/>
+          <a:lstStyle/>
+          <a:p>
+            <a:r>
+              <a:rPr lang="en-US" dirty="0"/>
+              <a:t>Case study: tax calculator</a:t>
+            </a:r>
+          </a:p>
+        </p:txBody>
+      </p:sp>
+      <p:sp>
+        <p:nvSpPr>
+          <p:cNvPr id="3" name="Content Placeholder 2">
+            <a:extLst>
+              <a:ext uri="{FF2B5EF4-FFF2-40B4-BE49-F238E27FC236}">
+                <a16:creationId xmlns:a16="http://schemas.microsoft.com/office/drawing/2014/main" id="{C9ED24F4-E7CB-554F-9BDF-759C610BE40A}"/>
+              </a:ext>
+            </a:extLst>
+          </p:cNvPr>
+          <p:cNvSpPr>
+            <a:spLocks noGrp="1"/>
+          </p:cNvSpPr>
+          <p:nvPr>
+            <p:ph idx="1"/>
+          </p:nvPr>
+        </p:nvSpPr>
+        <p:spPr/>
+        <p:txBody>
+          <a:bodyPr>
+            <a:normAutofit fontScale="92500" lnSpcReduction="10000"/>
+          </a:bodyPr>
+          <a:lstStyle/>
+          <a:p>
+            <a:r>
+              <a:rPr lang="en-US" dirty="0"/>
+              <a:t>Or alternatively, perhaps you are worried about different sales tax calculations (in different countries, for instance).</a:t>
+            </a:r>
+          </a:p>
+          <a:p>
+            <a:r>
+              <a:rPr lang="en-US" dirty="0"/>
+              <a:t>Perhaps it would be better to have a specific </a:t>
+            </a:r>
+            <a:r>
+              <a:rPr lang="en-US" dirty="0" err="1"/>
+              <a:t>TaxCalculator</a:t>
+            </a:r>
+            <a:r>
+              <a:rPr lang="en-US" dirty="0"/>
+              <a:t>() Controller responsible for the calculation of sales tax.</a:t>
+            </a:r>
+          </a:p>
+          <a:p>
+            <a:r>
+              <a:rPr lang="en-US" dirty="0"/>
+              <a:t>Design is not about right and wrong - but balancing the different advantages and disadvantages.</a:t>
+            </a:r>
+          </a:p>
+          <a:p>
+            <a:endParaRPr lang="en-US" dirty="0"/>
+          </a:p>
+        </p:txBody>
+      </p:sp>
+    </p:spTree>
+    <p:extLst>
+      <p:ext uri="{BB962C8B-B14F-4D97-AF65-F5344CB8AC3E}">
+        <p14:creationId xmlns:p14="http://schemas.microsoft.com/office/powerpoint/2010/main" val="340052743"/>
+      </p:ext>
+    </p:extLst>
+  </p:cSld>
+  <p:clrMapOvr>
+    <a:masterClrMapping/>
+  </p:clrMapOvr>
+</p:sld>
+</file>
+
+<file path=ppt/slides/slide71.xml><?xml version="1.0" encoding="utf-8"?>
+<p:sld xmlns:a="http://schemas.openxmlformats.org/drawingml/2006/main" xmlns:r="http://schemas.openxmlformats.org/officeDocument/2006/relationships" xmlns:p="http://schemas.openxmlformats.org/presentationml/2006/main">
+  <p:cSld>
+    <p:spTree>
+      <p:nvGrpSpPr>
+        <p:cNvPr id="1" name=""/>
+        <p:cNvGrpSpPr/>
+        <p:nvPr/>
+      </p:nvGrpSpPr>
+      <p:grpSpPr>
+        <a:xfrm>
+          <a:off x="0" y="0"/>
+          <a:ext cx="0" cy="0"/>
+          <a:chOff x="0" y="0"/>
+          <a:chExt cx="0" cy="0"/>
+        </a:xfrm>
+      </p:grpSpPr>
+      <p:sp>
+        <p:nvSpPr>
+          <p:cNvPr id="2" name="Title 1">
+            <a:extLst>
+              <a:ext uri="{FF2B5EF4-FFF2-40B4-BE49-F238E27FC236}">
+                <a16:creationId xmlns:a16="http://schemas.microsoft.com/office/drawing/2014/main" id="{90421329-B856-C444-95B1-A931EFA8DB5B}"/>
+              </a:ext>
+            </a:extLst>
+          </p:cNvPr>
+          <p:cNvSpPr>
+            <a:spLocks noGrp="1"/>
+          </p:cNvSpPr>
+          <p:nvPr>
+            <p:ph type="title"/>
+          </p:nvPr>
+        </p:nvSpPr>
+        <p:spPr/>
+        <p:txBody>
+          <a:bodyPr/>
+          <a:lstStyle/>
+          <a:p>
+            <a:r>
+              <a:rPr lang="en-US" dirty="0"/>
+              <a:t>Use case realizations</a:t>
+            </a:r>
+          </a:p>
+        </p:txBody>
+      </p:sp>
+      <p:sp>
+        <p:nvSpPr>
+          <p:cNvPr id="3" name="Content Placeholder 2">
+            <a:extLst>
+              <a:ext uri="{FF2B5EF4-FFF2-40B4-BE49-F238E27FC236}">
+                <a16:creationId xmlns:a16="http://schemas.microsoft.com/office/drawing/2014/main" id="{EA71C87F-CD37-9747-91F8-398E60654DB4}"/>
+              </a:ext>
+            </a:extLst>
+          </p:cNvPr>
+          <p:cNvSpPr>
+            <a:spLocks noGrp="1"/>
+          </p:cNvSpPr>
+          <p:nvPr>
+            <p:ph idx="1"/>
+          </p:nvPr>
+        </p:nvSpPr>
+        <p:spPr/>
+        <p:txBody>
+          <a:bodyPr>
+            <a:normAutofit/>
+          </a:bodyPr>
+          <a:lstStyle/>
+          <a:p>
+            <a:r>
+              <a:rPr lang="en-US" dirty="0"/>
+              <a:t>These examples show how to use the information in a use case during the design process.</a:t>
+            </a:r>
+          </a:p>
+          <a:p>
+            <a:r>
+              <a:rPr lang="en-US" dirty="0"/>
+              <a:t>Read Chapter 17 of </a:t>
+            </a:r>
+            <a:r>
+              <a:rPr lang="en-US" dirty="0" err="1"/>
+              <a:t>Larman's</a:t>
+            </a:r>
+            <a:r>
+              <a:rPr lang="en-US" dirty="0"/>
+              <a:t> </a:t>
+            </a:r>
+            <a:r>
+              <a:rPr lang="en-US" i="1" dirty="0"/>
+              <a:t>Applying UML and Patterns </a:t>
+            </a:r>
+            <a:r>
+              <a:rPr lang="en-US" dirty="0"/>
+              <a:t>for a thorough analysis.</a:t>
+            </a:r>
+          </a:p>
+        </p:txBody>
+      </p:sp>
+    </p:spTree>
+    <p:extLst>
+      <p:ext uri="{BB962C8B-B14F-4D97-AF65-F5344CB8AC3E}">
+        <p14:creationId xmlns:p14="http://schemas.microsoft.com/office/powerpoint/2010/main" val="1024847807"/>
+      </p:ext>
+    </p:extLst>
+  </p:cSld>
+  <p:clrMapOvr>
+    <a:masterClrMapping/>
+  </p:clrMapOvr>
+</p:sld>
+</file>
+
+<file path=ppt/slides/slide72.xml><?xml version="1.0" encoding="utf-8"?>
+<p:sld xmlns:a="http://schemas.openxmlformats.org/drawingml/2006/main" xmlns:r="http://schemas.openxmlformats.org/officeDocument/2006/relationships" xmlns:p="http://schemas.openxmlformats.org/presentationml/2006/main">
+  <p:cSld>
+    <p:spTree>
+      <p:nvGrpSpPr>
+        <p:cNvPr id="1" name=""/>
+        <p:cNvGrpSpPr/>
+        <p:nvPr/>
+      </p:nvGrpSpPr>
+      <p:grpSpPr>
+        <a:xfrm>
+          <a:off x="0" y="0"/>
+          <a:ext cx="0" cy="0"/>
+          <a:chOff x="0" y="0"/>
+          <a:chExt cx="0" cy="0"/>
+        </a:xfrm>
+      </p:grpSpPr>
+      <p:sp>
+        <p:nvSpPr>
+          <p:cNvPr id="2" name="Title 1">
+            <a:extLst>
+              <a:ext uri="{FF2B5EF4-FFF2-40B4-BE49-F238E27FC236}">
+                <a16:creationId xmlns:a16="http://schemas.microsoft.com/office/drawing/2014/main" id="{41B647BC-1DE6-AE44-BEAB-BF107E2161B7}"/>
+              </a:ext>
+            </a:extLst>
+          </p:cNvPr>
+          <p:cNvSpPr>
+            <a:spLocks noGrp="1"/>
+          </p:cNvSpPr>
+          <p:nvPr>
+            <p:ph type="title"/>
+          </p:nvPr>
+        </p:nvSpPr>
+        <p:spPr/>
+        <p:txBody>
+          <a:bodyPr/>
+          <a:lstStyle/>
+          <a:p>
+            <a:r>
+              <a:rPr lang="en-US" dirty="0"/>
+              <a:t>Design validation</a:t>
+            </a:r>
+          </a:p>
+        </p:txBody>
+      </p:sp>
+      <p:sp>
+        <p:nvSpPr>
+          <p:cNvPr id="3" name="Content Placeholder 2">
+            <a:extLst>
+              <a:ext uri="{FF2B5EF4-FFF2-40B4-BE49-F238E27FC236}">
+                <a16:creationId xmlns:a16="http://schemas.microsoft.com/office/drawing/2014/main" id="{B9A8E35B-1327-1445-A131-532634B16040}"/>
+              </a:ext>
+            </a:extLst>
+          </p:cNvPr>
+          <p:cNvSpPr>
+            <a:spLocks noGrp="1"/>
+          </p:cNvSpPr>
+          <p:nvPr>
+            <p:ph idx="1"/>
+          </p:nvPr>
+        </p:nvSpPr>
+        <p:spPr/>
+        <p:txBody>
+          <a:bodyPr>
+            <a:normAutofit fontScale="92500"/>
+          </a:bodyPr>
+          <a:lstStyle/>
+          <a:p>
+            <a:r>
+              <a:rPr lang="en-US" dirty="0"/>
+              <a:t>You can use the same techniques to check whether a design can implement a use case correctly. Does every class have the required information to perform some computation?</a:t>
+            </a:r>
+          </a:p>
+          <a:p>
+            <a:r>
+              <a:rPr lang="en-US" dirty="0"/>
+              <a:t>For example, when computing the total sale price, how does the Sale object know the price of the individual items? Or the quantities?</a:t>
+            </a:r>
+          </a:p>
+          <a:p>
+            <a:endParaRPr lang="en-US" dirty="0"/>
+          </a:p>
+        </p:txBody>
+      </p:sp>
+    </p:spTree>
+    <p:extLst>
+      <p:ext uri="{BB962C8B-B14F-4D97-AF65-F5344CB8AC3E}">
+        <p14:creationId xmlns:p14="http://schemas.microsoft.com/office/powerpoint/2010/main" val="4102829505"/>
+      </p:ext>
+    </p:extLst>
+  </p:cSld>
+  <p:clrMapOvr>
+    <a:masterClrMapping/>
+  </p:clrMapOvr>
+</p:sld>
+</file>
+
+<file path=ppt/slides/slide73.xml><?xml version="1.0" encoding="utf-8"?>
+<p:sld xmlns:a="http://schemas.openxmlformats.org/drawingml/2006/main" xmlns:r="http://schemas.openxmlformats.org/officeDocument/2006/relationships" xmlns:p="http://schemas.openxmlformats.org/presentationml/2006/main">
+  <p:cSld>
+    <p:spTree>
+      <p:nvGrpSpPr>
+        <p:cNvPr id="1" name=""/>
+        <p:cNvGrpSpPr/>
+        <p:nvPr/>
+      </p:nvGrpSpPr>
+      <p:grpSpPr>
+        <a:xfrm>
+          <a:off x="0" y="0"/>
+          <a:ext cx="0" cy="0"/>
+          <a:chOff x="0" y="0"/>
+          <a:chExt cx="0" cy="0"/>
+        </a:xfrm>
+      </p:grpSpPr>
+      <p:sp>
+        <p:nvSpPr>
+          <p:cNvPr id="2" name="Title 1">
+            <a:extLst>
+              <a:ext uri="{FF2B5EF4-FFF2-40B4-BE49-F238E27FC236}">
+                <a16:creationId xmlns:a16="http://schemas.microsoft.com/office/drawing/2014/main" id="{9E4DB9EA-F214-7149-AA74-4F5E6DB69FF4}"/>
+              </a:ext>
+            </a:extLst>
+          </p:cNvPr>
+          <p:cNvSpPr>
+            <a:spLocks noGrp="1"/>
+          </p:cNvSpPr>
+          <p:nvPr>
+            <p:ph type="title"/>
+          </p:nvPr>
+        </p:nvSpPr>
+        <p:spPr/>
+        <p:txBody>
+          <a:bodyPr/>
+          <a:lstStyle/>
+          <a:p>
+            <a:r>
+              <a:rPr lang="en-US" dirty="0"/>
+              <a:t>Different forms of information</a:t>
+            </a:r>
+          </a:p>
+        </p:txBody>
+      </p:sp>
+      <p:sp>
+        <p:nvSpPr>
+          <p:cNvPr id="3" name="Content Placeholder 2">
+            <a:extLst>
+              <a:ext uri="{FF2B5EF4-FFF2-40B4-BE49-F238E27FC236}">
+                <a16:creationId xmlns:a16="http://schemas.microsoft.com/office/drawing/2014/main" id="{B11FFB68-19F6-6443-89AA-16C73FB5769A}"/>
+              </a:ext>
+            </a:extLst>
+          </p:cNvPr>
+          <p:cNvSpPr>
+            <a:spLocks noGrp="1"/>
+          </p:cNvSpPr>
+          <p:nvPr>
+            <p:ph idx="1"/>
+          </p:nvPr>
+        </p:nvSpPr>
+        <p:spPr/>
+        <p:txBody>
+          <a:bodyPr>
+            <a:normAutofit fontScale="85000" lnSpcReduction="20000"/>
+          </a:bodyPr>
+          <a:lstStyle/>
+          <a:p>
+            <a:pPr marL="0" indent="0">
+              <a:buNone/>
+            </a:pPr>
+            <a:r>
+              <a:rPr lang="en-US" dirty="0"/>
+              <a:t>There are four different ways in which a class A may have access to certain information in a class B:</a:t>
+            </a:r>
+          </a:p>
+          <a:p>
+            <a:r>
+              <a:rPr lang="en-US" dirty="0"/>
+              <a:t>Attribute visibility - B is an attribute of A</a:t>
+            </a:r>
+          </a:p>
+          <a:p>
+            <a:r>
+              <a:rPr lang="en-US" dirty="0"/>
+              <a:t>Parameter visibility - B is a parameter of a method of A</a:t>
+            </a:r>
+          </a:p>
+          <a:p>
+            <a:r>
+              <a:rPr lang="en-US" dirty="0"/>
+              <a:t>Local visibility - B is a local object in a method of A</a:t>
+            </a:r>
+          </a:p>
+          <a:p>
+            <a:r>
+              <a:rPr lang="en-US" dirty="0"/>
+              <a:t>Global visibility - B is globally visible to A (this is the least common form)</a:t>
+            </a:r>
+          </a:p>
+          <a:p>
+            <a:endParaRPr lang="en-US" dirty="0"/>
+          </a:p>
+        </p:txBody>
+      </p:sp>
+    </p:spTree>
+    <p:extLst>
+      <p:ext uri="{BB962C8B-B14F-4D97-AF65-F5344CB8AC3E}">
+        <p14:creationId xmlns:p14="http://schemas.microsoft.com/office/powerpoint/2010/main" val="3197902325"/>
+      </p:ext>
+    </p:extLst>
+  </p:cSld>
+  <p:clrMapOvr>
+    <a:masterClrMapping/>
+  </p:clrMapOvr>
+</p:sld>
+</file>
+
+<file path=ppt/slides/slide74.xml><?xml version="1.0" encoding="utf-8"?>
+<p:sld xmlns:a="http://schemas.openxmlformats.org/drawingml/2006/main" xmlns:r="http://schemas.openxmlformats.org/officeDocument/2006/relationships" xmlns:p="http://schemas.openxmlformats.org/presentationml/2006/main">
+  <p:cSld>
+    <p:spTree>
+      <p:nvGrpSpPr>
+        <p:cNvPr id="1" name=""/>
+        <p:cNvGrpSpPr/>
+        <p:nvPr/>
+      </p:nvGrpSpPr>
+      <p:grpSpPr>
+        <a:xfrm>
+          <a:off x="0" y="0"/>
+          <a:ext cx="0" cy="0"/>
+          <a:chOff x="0" y="0"/>
+          <a:chExt cx="0" cy="0"/>
+        </a:xfrm>
+      </p:grpSpPr>
+      <p:sp>
+        <p:nvSpPr>
+          <p:cNvPr id="2" name="Title 1">
+            <a:extLst>
+              <a:ext uri="{FF2B5EF4-FFF2-40B4-BE49-F238E27FC236}">
+                <a16:creationId xmlns:a16="http://schemas.microsoft.com/office/drawing/2014/main" id="{081259CE-1494-974D-AB14-432DD4951468}"/>
+              </a:ext>
+            </a:extLst>
+          </p:cNvPr>
+          <p:cNvSpPr>
+            <a:spLocks noGrp="1"/>
+          </p:cNvSpPr>
+          <p:nvPr>
+            <p:ph type="title"/>
+          </p:nvPr>
+        </p:nvSpPr>
+        <p:spPr/>
+        <p:txBody>
+          <a:bodyPr/>
+          <a:lstStyle/>
+          <a:p>
+            <a:r>
+              <a:rPr lang="en-US" dirty="0"/>
+              <a:t>Design validation</a:t>
+            </a:r>
+          </a:p>
+        </p:txBody>
+      </p:sp>
+      <p:sp>
+        <p:nvSpPr>
+          <p:cNvPr id="3" name="Content Placeholder 2">
+            <a:extLst>
+              <a:ext uri="{FF2B5EF4-FFF2-40B4-BE49-F238E27FC236}">
+                <a16:creationId xmlns:a16="http://schemas.microsoft.com/office/drawing/2014/main" id="{26CE1301-6B9D-8B46-AAF8-F3A6CB8F45AE}"/>
+              </a:ext>
+            </a:extLst>
+          </p:cNvPr>
+          <p:cNvSpPr>
+            <a:spLocks noGrp="1"/>
+          </p:cNvSpPr>
+          <p:nvPr>
+            <p:ph idx="1"/>
+          </p:nvPr>
+        </p:nvSpPr>
+        <p:spPr/>
+        <p:txBody>
+          <a:bodyPr/>
+          <a:lstStyle/>
+          <a:p>
+            <a:pPr marL="0" indent="0">
+              <a:buNone/>
+            </a:pPr>
+            <a:r>
+              <a:rPr lang="en-US" dirty="0"/>
+              <a:t>When checking a design, run through use cases, and ask yourself the question:</a:t>
+            </a:r>
+          </a:p>
+          <a:p>
+            <a:pPr marL="0" indent="0">
+              <a:buNone/>
+            </a:pPr>
+            <a:r>
+              <a:rPr lang="en-US" dirty="0"/>
+              <a:t>How is the necessary information visible?</a:t>
+            </a:r>
+          </a:p>
+        </p:txBody>
+      </p:sp>
+    </p:spTree>
+    <p:extLst>
+      <p:ext uri="{BB962C8B-B14F-4D97-AF65-F5344CB8AC3E}">
+        <p14:creationId xmlns:p14="http://schemas.microsoft.com/office/powerpoint/2010/main" val="3718056275"/>
+      </p:ext>
+    </p:extLst>
+  </p:cSld>
+  <p:clrMapOvr>
+    <a:masterClrMapping/>
+  </p:clrMapOvr>
+</p:sld>
+</file>
+
+<file path=ppt/slides/slide75.xml><?xml version="1.0" encoding="utf-8"?>
+<p:sld xmlns:a="http://schemas.openxmlformats.org/drawingml/2006/main" xmlns:r="http://schemas.openxmlformats.org/officeDocument/2006/relationships" xmlns:p="http://schemas.openxmlformats.org/presentationml/2006/main">
+  <p:cSld>
+    <p:spTree>
+      <p:nvGrpSpPr>
+        <p:cNvPr id="1" name=""/>
+        <p:cNvGrpSpPr/>
+        <p:nvPr/>
+      </p:nvGrpSpPr>
+      <p:grpSpPr>
+        <a:xfrm>
+          <a:off x="0" y="0"/>
+          <a:ext cx="0" cy="0"/>
+          <a:chOff x="0" y="0"/>
+          <a:chExt cx="0" cy="0"/>
+        </a:xfrm>
+      </p:grpSpPr>
+      <p:sp>
+        <p:nvSpPr>
+          <p:cNvPr id="2" name="Title 1">
+            <a:extLst>
+              <a:ext uri="{FF2B5EF4-FFF2-40B4-BE49-F238E27FC236}">
+                <a16:creationId xmlns:a16="http://schemas.microsoft.com/office/drawing/2014/main" id="{9AE41720-005A-3E46-921F-9BE071F9475E}"/>
+              </a:ext>
+            </a:extLst>
+          </p:cNvPr>
+          <p:cNvSpPr>
+            <a:spLocks noGrp="1"/>
+          </p:cNvSpPr>
+          <p:nvPr>
+            <p:ph type="title"/>
+          </p:nvPr>
+        </p:nvSpPr>
+        <p:spPr/>
+        <p:txBody>
+          <a:bodyPr/>
+          <a:lstStyle/>
+          <a:p>
+            <a:r>
+              <a:rPr lang="en-US" dirty="0"/>
+              <a:t>What we have seen today</a:t>
+            </a:r>
+          </a:p>
+        </p:txBody>
+      </p:sp>
+      <p:sp>
+        <p:nvSpPr>
+          <p:cNvPr id="3" name="Content Placeholder 2">
+            <a:extLst>
+              <a:ext uri="{FF2B5EF4-FFF2-40B4-BE49-F238E27FC236}">
+                <a16:creationId xmlns:a16="http://schemas.microsoft.com/office/drawing/2014/main" id="{DE3BCC44-BD62-2543-AAE7-8DACE8C29E91}"/>
+              </a:ext>
+            </a:extLst>
+          </p:cNvPr>
+          <p:cNvSpPr>
+            <a:spLocks noGrp="1"/>
+          </p:cNvSpPr>
+          <p:nvPr>
+            <p:ph idx="1"/>
+          </p:nvPr>
+        </p:nvSpPr>
+        <p:spPr/>
+        <p:txBody>
+          <a:bodyPr>
+            <a:normAutofit fontScale="92500" lnSpcReduction="10000"/>
+          </a:bodyPr>
+          <a:lstStyle/>
+          <a:p>
+            <a:r>
+              <a:rPr lang="en-US" dirty="0"/>
+              <a:t>We should think of objects abstractly as managing </a:t>
+            </a:r>
+            <a:r>
+              <a:rPr lang="en-US" i="1" dirty="0"/>
+              <a:t>responsibilities</a:t>
+            </a:r>
+          </a:p>
+          <a:p>
+            <a:r>
+              <a:rPr lang="en-US" dirty="0"/>
+              <a:t>We can use the GRASP principles to assign responsibilities to the conceptual classes in our domain model</a:t>
+            </a:r>
+          </a:p>
+          <a:p>
+            <a:r>
+              <a:rPr lang="en-US" dirty="0"/>
+              <a:t>Doing so is a step towards turning our domain model into a concrete design</a:t>
+            </a:r>
+          </a:p>
+          <a:p>
+            <a:endParaRPr lang="en-US" dirty="0"/>
+          </a:p>
+        </p:txBody>
+      </p:sp>
+    </p:spTree>
+    <p:extLst>
+      <p:ext uri="{BB962C8B-B14F-4D97-AF65-F5344CB8AC3E}">
+        <p14:creationId xmlns:p14="http://schemas.microsoft.com/office/powerpoint/2010/main" val="2464104585"/>
+      </p:ext>
+    </p:extLst>
+  </p:cSld>
+  <p:clrMapOvr>
+    <a:masterClrMapping/>
+  </p:clrMapOvr>
+</p:sld>
+</file>
+
+<file path=ppt/slides/slide76.xml><?xml version="1.0" encoding="utf-8"?>
+<p:sld xmlns:a="http://schemas.openxmlformats.org/drawingml/2006/main" xmlns:r="http://schemas.openxmlformats.org/officeDocument/2006/relationships" xmlns:p="http://schemas.openxmlformats.org/presentationml/2006/main">
+  <p:cSld>
+    <p:spTree>
+      <p:nvGrpSpPr>
+        <p:cNvPr id="1" name=""/>
+        <p:cNvGrpSpPr/>
+        <p:nvPr/>
+      </p:nvGrpSpPr>
+      <p:grpSpPr>
+        <a:xfrm>
+          <a:off x="0" y="0"/>
+          <a:ext cx="0" cy="0"/>
+          <a:chOff x="0" y="0"/>
+          <a:chExt cx="0" cy="0"/>
+        </a:xfrm>
+      </p:grpSpPr>
+      <p:sp>
+        <p:nvSpPr>
+          <p:cNvPr id="2" name="Title 1">
+            <a:extLst>
+              <a:ext uri="{FF2B5EF4-FFF2-40B4-BE49-F238E27FC236}">
+                <a16:creationId xmlns:a16="http://schemas.microsoft.com/office/drawing/2014/main" id="{FB6F6517-EBCE-F64A-A2B3-F1F1BDC42B40}"/>
+              </a:ext>
+            </a:extLst>
+          </p:cNvPr>
+          <p:cNvSpPr>
+            <a:spLocks noGrp="1"/>
+          </p:cNvSpPr>
+          <p:nvPr>
+            <p:ph type="title"/>
+          </p:nvPr>
+        </p:nvSpPr>
+        <p:spPr/>
+        <p:txBody>
+          <a:bodyPr/>
+          <a:lstStyle/>
+          <a:p>
+            <a:r>
+              <a:rPr lang="en-US" dirty="0"/>
+              <a:t>Material covered</a:t>
+            </a:r>
+          </a:p>
+        </p:txBody>
+      </p:sp>
+      <p:sp>
+        <p:nvSpPr>
+          <p:cNvPr id="3" name="Content Placeholder 2">
+            <a:extLst>
+              <a:ext uri="{FF2B5EF4-FFF2-40B4-BE49-F238E27FC236}">
+                <a16:creationId xmlns:a16="http://schemas.microsoft.com/office/drawing/2014/main" id="{3B6DCD6C-EB39-3F41-A422-3597BC2BF393}"/>
+              </a:ext>
+            </a:extLst>
+          </p:cNvPr>
+          <p:cNvSpPr>
+            <a:spLocks noGrp="1"/>
+          </p:cNvSpPr>
+          <p:nvPr>
+            <p:ph idx="1"/>
+          </p:nvPr>
+        </p:nvSpPr>
+        <p:spPr/>
+        <p:txBody>
+          <a:bodyPr/>
+          <a:lstStyle/>
+          <a:p>
+            <a:r>
+              <a:rPr lang="en-US" dirty="0"/>
+              <a:t>Design Patterns explained: chapter 1</a:t>
+            </a:r>
+          </a:p>
+          <a:p>
+            <a:r>
+              <a:rPr lang="en-US" dirty="0"/>
+              <a:t>Applying UML and patterns: chapter 16-19</a:t>
+            </a:r>
+          </a:p>
+        </p:txBody>
+      </p:sp>
+    </p:spTree>
+    <p:extLst>
+      <p:ext uri="{BB962C8B-B14F-4D97-AF65-F5344CB8AC3E}">
+        <p14:creationId xmlns:p14="http://schemas.microsoft.com/office/powerpoint/2010/main" val="3018938767"/>
       </p:ext>
     </p:extLst>
   </p:cSld>

</xml_diff>